<commit_message>
showing weights after each new node is added to spanning tree, slide 10
</commit_message>
<xml_diff>
--- a/Slides-RPR/2019-H1-DAA-L24-Greedy-Algo-MCST-Prim.pptx
+++ b/Slides-RPR/2019-H1-DAA-L24-Greedy-Algo-MCST-Prim.pptx
@@ -3904,7 +3904,7 @@
         </p:nvSpPr>
         <p:spPr>
           <a:xfrm>
-            <a:off x="3812021" y="2691311"/>
+            <a:off x="3812022" y="2691311"/>
             <a:ext cx="1" cy="581870"/>
           </a:xfrm>
           <a:prstGeom prst="line">
@@ -4050,6 +4050,351 @@
             <a:pPr/>
             <a:r>
               <a:t>d</a:t>
+            </a:r>
+          </a:p>
+        </p:txBody>
+      </p:sp>
+      <p:sp>
+        <p:nvSpPr>
+          <p:cNvPr id="339" name="w(a):0,w(b):∞,w(c):∞,w(d)=∞,w(e)=∞,w(f)=∞"/>
+          <p:cNvSpPr txBox="1"/>
+          <p:nvPr/>
+        </p:nvSpPr>
+        <p:spPr>
+          <a:xfrm>
+            <a:off x="894006" y="3884641"/>
+            <a:ext cx="8279183" cy="482601"/>
+          </a:xfrm>
+          <a:prstGeom prst="rect">
+            <a:avLst/>
+          </a:prstGeom>
+          <a:ln w="12700">
+            <a:miter lim="400000"/>
+          </a:ln>
+          <a:extLst>
+            <a:ext uri="{C572A759-6A51-4108-AA02-DFA0A04FC94B}">
+              <ma14:wrappingTextBoxFlag xmlns:ma14="http://schemas.microsoft.com/office/mac/drawingml/2011/main" val="1"/>
+            </a:ext>
+          </a:extLst>
+        </p:spPr>
+        <p:txBody>
+          <a:bodyPr wrap="none" lIns="50800" tIns="50800" rIns="50800" bIns="50800" anchor="ctr">
+            <a:spAutoFit/>
+          </a:bodyPr>
+          <a:lstStyle>
+            <a:lvl1pPr>
+              <a:defRPr sz="2600">
+                <a:latin typeface="Courier New"/>
+                <a:ea typeface="Courier New"/>
+                <a:cs typeface="Courier New"/>
+                <a:sym typeface="Courier New"/>
+              </a:defRPr>
+            </a:lvl1pPr>
+          </a:lstStyle>
+          <a:p>
+            <a:pPr/>
+            <a:r>
+              <a:t>w(a):0,w(b):∞,w(c):∞,w(d)=∞,w(e)=∞,w(f)=∞</a:t>
+            </a:r>
+          </a:p>
+        </p:txBody>
+      </p:sp>
+      <p:sp>
+        <p:nvSpPr>
+          <p:cNvPr id="340" name="w(a):0,w(b):3,w(c):∞,w(d)=∞,w(e)=6,w(f)=5"/>
+          <p:cNvSpPr txBox="1"/>
+          <p:nvPr/>
+        </p:nvSpPr>
+        <p:spPr>
+          <a:xfrm>
+            <a:off x="894782" y="4286844"/>
+            <a:ext cx="8279183" cy="482601"/>
+          </a:xfrm>
+          <a:prstGeom prst="rect">
+            <a:avLst/>
+          </a:prstGeom>
+          <a:ln w="12700">
+            <a:miter lim="400000"/>
+          </a:ln>
+          <a:extLst>
+            <a:ext uri="{C572A759-6A51-4108-AA02-DFA0A04FC94B}">
+              <ma14:wrappingTextBoxFlag xmlns:ma14="http://schemas.microsoft.com/office/mac/drawingml/2011/main" val="1"/>
+            </a:ext>
+          </a:extLst>
+        </p:spPr>
+        <p:txBody>
+          <a:bodyPr wrap="none" lIns="50800" tIns="50800" rIns="50800" bIns="50800" anchor="ctr">
+            <a:spAutoFit/>
+          </a:bodyPr>
+          <a:lstStyle/>
+          <a:p>
+            <a:pPr>
+              <a:defRPr sz="2600">
+                <a:latin typeface="Courier New"/>
+                <a:ea typeface="Courier New"/>
+                <a:cs typeface="Courier New"/>
+                <a:sym typeface="Courier New"/>
+              </a:defRPr>
+            </a:pPr>
+            <a:r>
+              <a:t>w(</a:t>
+            </a:r>
+            <a:r>
+              <a:rPr b="1"/>
+              <a:t>a</a:t>
+            </a:r>
+            <a:r>
+              <a:t>):0,w(b):3,w(c):∞,w(d)=∞,w(e)=6,w(f)=5</a:t>
+            </a:r>
+          </a:p>
+        </p:txBody>
+      </p:sp>
+      <p:sp>
+        <p:nvSpPr>
+          <p:cNvPr id="341" name="w(a):0,w(b):3,w(c):1,w(d)=∞,w(e)=6,w(f)=4"/>
+          <p:cNvSpPr txBox="1"/>
+          <p:nvPr/>
+        </p:nvSpPr>
+        <p:spPr>
+          <a:xfrm>
+            <a:off x="914390" y="4725384"/>
+            <a:ext cx="8279183" cy="482601"/>
+          </a:xfrm>
+          <a:prstGeom prst="rect">
+            <a:avLst/>
+          </a:prstGeom>
+          <a:ln w="12700">
+            <a:miter lim="400000"/>
+          </a:ln>
+          <a:extLst>
+            <a:ext uri="{C572A759-6A51-4108-AA02-DFA0A04FC94B}">
+              <ma14:wrappingTextBoxFlag xmlns:ma14="http://schemas.microsoft.com/office/mac/drawingml/2011/main" val="1"/>
+            </a:ext>
+          </a:extLst>
+        </p:spPr>
+        <p:txBody>
+          <a:bodyPr wrap="none" lIns="50800" tIns="50800" rIns="50800" bIns="50800" anchor="ctr">
+            <a:spAutoFit/>
+          </a:bodyPr>
+          <a:lstStyle/>
+          <a:p>
+            <a:pPr>
+              <a:defRPr sz="2600">
+                <a:latin typeface="Courier New"/>
+                <a:ea typeface="Courier New"/>
+                <a:cs typeface="Courier New"/>
+                <a:sym typeface="Courier New"/>
+              </a:defRPr>
+            </a:pPr>
+            <a:r>
+              <a:t>w(a):0,w(</a:t>
+            </a:r>
+            <a:r>
+              <a:rPr b="1"/>
+              <a:t>b</a:t>
+            </a:r>
+            <a:r>
+              <a:t>):3,w(c):1,w(d)=∞,w(e)=6,w(f)=4</a:t>
+            </a:r>
+          </a:p>
+        </p:txBody>
+      </p:sp>
+      <p:sp>
+        <p:nvSpPr>
+          <p:cNvPr id="342" name="w(a):0,w(b):3,w(c):1,w(d)=6,w(e)=6,w(f)=4"/>
+          <p:cNvSpPr txBox="1"/>
+          <p:nvPr/>
+        </p:nvSpPr>
+        <p:spPr>
+          <a:xfrm>
+            <a:off x="900217" y="5153931"/>
+            <a:ext cx="8279183" cy="482601"/>
+          </a:xfrm>
+          <a:prstGeom prst="rect">
+            <a:avLst/>
+          </a:prstGeom>
+          <a:ln w="12700">
+            <a:miter lim="400000"/>
+          </a:ln>
+          <a:extLst>
+            <a:ext uri="{C572A759-6A51-4108-AA02-DFA0A04FC94B}">
+              <ma14:wrappingTextBoxFlag xmlns:ma14="http://schemas.microsoft.com/office/mac/drawingml/2011/main" val="1"/>
+            </a:ext>
+          </a:extLst>
+        </p:spPr>
+        <p:txBody>
+          <a:bodyPr wrap="none" lIns="50800" tIns="50800" rIns="50800" bIns="50800" anchor="ctr">
+            <a:spAutoFit/>
+          </a:bodyPr>
+          <a:lstStyle/>
+          <a:p>
+            <a:pPr>
+              <a:defRPr sz="2600">
+                <a:latin typeface="Courier New"/>
+                <a:ea typeface="Courier New"/>
+                <a:cs typeface="Courier New"/>
+                <a:sym typeface="Courier New"/>
+              </a:defRPr>
+            </a:pPr>
+            <a:r>
+              <a:t>w(a):0,w(b):3,w(</a:t>
+            </a:r>
+            <a:r>
+              <a:rPr b="1"/>
+              <a:t>c</a:t>
+            </a:r>
+            <a:r>
+              <a:t>):1,w(d)=6,w(e)=6,w(f)=4</a:t>
+            </a:r>
+          </a:p>
+        </p:txBody>
+      </p:sp>
+      <p:sp>
+        <p:nvSpPr>
+          <p:cNvPr id="343" name="w(a):0,w(b):3,w(c):1,w(d)=5,w(e)=2,w(f)=4"/>
+          <p:cNvSpPr txBox="1"/>
+          <p:nvPr/>
+        </p:nvSpPr>
+        <p:spPr>
+          <a:xfrm>
+            <a:off x="894782" y="5616927"/>
+            <a:ext cx="8279183" cy="482601"/>
+          </a:xfrm>
+          <a:prstGeom prst="rect">
+            <a:avLst/>
+          </a:prstGeom>
+          <a:ln w="12700">
+            <a:miter lim="400000"/>
+          </a:ln>
+          <a:extLst>
+            <a:ext uri="{C572A759-6A51-4108-AA02-DFA0A04FC94B}">
+              <ma14:wrappingTextBoxFlag xmlns:ma14="http://schemas.microsoft.com/office/mac/drawingml/2011/main" val="1"/>
+            </a:ext>
+          </a:extLst>
+        </p:spPr>
+        <p:txBody>
+          <a:bodyPr wrap="none" lIns="50800" tIns="50800" rIns="50800" bIns="50800" anchor="ctr">
+            <a:spAutoFit/>
+          </a:bodyPr>
+          <a:lstStyle/>
+          <a:p>
+            <a:pPr>
+              <a:defRPr sz="2600">
+                <a:latin typeface="Courier New"/>
+                <a:ea typeface="Courier New"/>
+                <a:cs typeface="Courier New"/>
+                <a:sym typeface="Courier New"/>
+              </a:defRPr>
+            </a:pPr>
+            <a:r>
+              <a:t>w(a):0,w(b):3,w(c):1,w(d)=5,w(e)=2,w(</a:t>
+            </a:r>
+            <a:r>
+              <a:rPr b="1"/>
+              <a:t>f</a:t>
+            </a:r>
+            <a:r>
+              <a:t>)=4</a:t>
+            </a:r>
+          </a:p>
+        </p:txBody>
+      </p:sp>
+      <p:sp>
+        <p:nvSpPr>
+          <p:cNvPr id="344" name="w(a):0,w(b):3,w(c):1,w(d)=5,w(e)=2,w(f)=4"/>
+          <p:cNvSpPr txBox="1"/>
+          <p:nvPr/>
+        </p:nvSpPr>
+        <p:spPr>
+          <a:xfrm>
+            <a:off x="894782" y="6066345"/>
+            <a:ext cx="8279183" cy="482601"/>
+          </a:xfrm>
+          <a:prstGeom prst="rect">
+            <a:avLst/>
+          </a:prstGeom>
+          <a:ln w="12700">
+            <a:miter lim="400000"/>
+          </a:ln>
+          <a:extLst>
+            <a:ext uri="{C572A759-6A51-4108-AA02-DFA0A04FC94B}">
+              <ma14:wrappingTextBoxFlag xmlns:ma14="http://schemas.microsoft.com/office/mac/drawingml/2011/main" val="1"/>
+            </a:ext>
+          </a:extLst>
+        </p:spPr>
+        <p:txBody>
+          <a:bodyPr wrap="none" lIns="50800" tIns="50800" rIns="50800" bIns="50800" anchor="ctr">
+            <a:spAutoFit/>
+          </a:bodyPr>
+          <a:lstStyle/>
+          <a:p>
+            <a:pPr>
+              <a:defRPr sz="2600">
+                <a:latin typeface="Courier New"/>
+                <a:ea typeface="Courier New"/>
+                <a:cs typeface="Courier New"/>
+                <a:sym typeface="Courier New"/>
+              </a:defRPr>
+            </a:pPr>
+            <a:r>
+              <a:t>w(a):0,w(b):3,w(c):1,w(d)=5,w(</a:t>
+            </a:r>
+            <a:r>
+              <a:rPr b="1"/>
+              <a:t>e</a:t>
+            </a:r>
+            <a:r>
+              <a:t>)=2,w(f)=4</a:t>
+            </a:r>
+          </a:p>
+        </p:txBody>
+      </p:sp>
+      <p:sp>
+        <p:nvSpPr>
+          <p:cNvPr id="345" name="w(a):0,w(b):3,w(c):1,w(d)=5,w(e)=2,w(f)=4"/>
+          <p:cNvSpPr txBox="1"/>
+          <p:nvPr/>
+        </p:nvSpPr>
+        <p:spPr>
+          <a:xfrm>
+            <a:off x="894782" y="6508470"/>
+            <a:ext cx="8279183" cy="482601"/>
+          </a:xfrm>
+          <a:prstGeom prst="rect">
+            <a:avLst/>
+          </a:prstGeom>
+          <a:ln w="12700">
+            <a:miter lim="400000"/>
+          </a:ln>
+          <a:extLst>
+            <a:ext uri="{C572A759-6A51-4108-AA02-DFA0A04FC94B}">
+              <ma14:wrappingTextBoxFlag xmlns:ma14="http://schemas.microsoft.com/office/mac/drawingml/2011/main" val="1"/>
+            </a:ext>
+          </a:extLst>
+        </p:spPr>
+        <p:txBody>
+          <a:bodyPr wrap="none" lIns="50800" tIns="50800" rIns="50800" bIns="50800" anchor="ctr">
+            <a:spAutoFit/>
+          </a:bodyPr>
+          <a:lstStyle/>
+          <a:p>
+            <a:pPr>
+              <a:defRPr sz="2600">
+                <a:latin typeface="Courier New"/>
+                <a:ea typeface="Courier New"/>
+                <a:cs typeface="Courier New"/>
+                <a:sym typeface="Courier New"/>
+              </a:defRPr>
+            </a:pPr>
+            <a:r>
+              <a:t>w(a):0,w(b):3,w(c):1,w(</a:t>
+            </a:r>
+            <a:r>
+              <a:rPr b="1"/>
+              <a:t>d</a:t>
+            </a:r>
+            <a:r>
+              <a:t>)=5,w(e)=2,w(f)=4</a:t>
             </a:r>
           </a:p>
         </p:txBody>
@@ -4143,7 +4488,7 @@
                                       <p:cBhvr>
                                         <p:cTn id="10" fill="hold"/>
                                         <p:tgtEl>
-                                          <p:spTgt spid="330"/>
+                                          <p:spTgt spid="339"/>
                                         </p:tgtEl>
                                         <p:attrNameLst>
                                           <p:attrName>style.visibility</p:attrName>
@@ -4175,34 +4520,28 @@
                             </p:stCondLst>
                             <p:childTnLst>
                               <p:par>
-                                <p:cTn id="13" presetClass="emph" nodeType="clickEffect" presetSubtype="0" presetID="35" grpId="3" repeatCount="4000" fill="hold">
+                                <p:cTn id="13" presetClass="entr" nodeType="clickEffect" presetSubtype="0" presetID="1" grpId="3" fill="hold">
                                   <p:stCondLst>
                                     <p:cond delay="0"/>
                                   </p:stCondLst>
+                                  <p:iterate type="el" backwards="0">
+                                    <p:tmAbs val="0"/>
+                                  </p:iterate>
                                   <p:childTnLst>
-                                    <p:anim calcmode="discrete" valueType="str">
+                                    <p:set>
                                       <p:cBhvr>
-                                        <p:cTn id="14" dur="1000" fill="hold"/>
+                                        <p:cTn id="14" fill="hold"/>
                                         <p:tgtEl>
-                                          <p:spTgt spid="308"/>
+                                          <p:spTgt spid="330"/>
                                         </p:tgtEl>
                                         <p:attrNameLst>
                                           <p:attrName>style.visibility</p:attrName>
                                         </p:attrNameLst>
                                       </p:cBhvr>
-                                      <p:tavLst>
-                                        <p:tav tm="0">
-                                          <p:val>
-                                            <p:strVal val="hidden"/>
-                                          </p:val>
-                                        </p:tav>
-                                        <p:tav tm="50000">
-                                          <p:val>
-                                            <p:strVal val="visible"/>
-                                          </p:val>
-                                        </p:tav>
-                                      </p:tavLst>
-                                    </p:anim>
+                                      <p:to>
+                                        <p:strVal val="visible"/>
+                                      </p:to>
+                                    </p:set>
                                   </p:childTnLst>
                                 </p:cTn>
                               </p:par>
@@ -4234,7 +4573,7 @@
                                       <p:cBhvr>
                                         <p:cTn id="18" dur="1000" fill="hold"/>
                                         <p:tgtEl>
-                                          <p:spTgt spid="315"/>
+                                          <p:spTgt spid="308"/>
                                         </p:tgtEl>
                                         <p:attrNameLst>
                                           <p:attrName>style.visibility</p:attrName>
@@ -4284,7 +4623,7 @@
                                       <p:cBhvr>
                                         <p:cTn id="22" dur="1000" fill="hold"/>
                                         <p:tgtEl>
-                                          <p:spTgt spid="311"/>
+                                          <p:spTgt spid="315"/>
                                         </p:tgtEl>
                                         <p:attrNameLst>
                                           <p:attrName>style.visibility</p:attrName>
@@ -4325,28 +4664,34 @@
                             </p:stCondLst>
                             <p:childTnLst>
                               <p:par>
-                                <p:cTn id="25" presetClass="entr" nodeType="clickEffect" presetSubtype="0" presetID="1" grpId="6" fill="hold">
+                                <p:cTn id="25" presetClass="emph" nodeType="clickEffect" presetSubtype="0" presetID="35" grpId="6" repeatCount="4000" fill="hold">
                                   <p:stCondLst>
                                     <p:cond delay="0"/>
                                   </p:stCondLst>
-                                  <p:iterate type="el" backwards="0">
-                                    <p:tmAbs val="0"/>
-                                  </p:iterate>
                                   <p:childTnLst>
-                                    <p:set>
+                                    <p:anim calcmode="discrete" valueType="str">
                                       <p:cBhvr>
-                                        <p:cTn id="26" fill="hold"/>
+                                        <p:cTn id="26" dur="1000" fill="hold"/>
                                         <p:tgtEl>
-                                          <p:spTgt spid="328"/>
+                                          <p:spTgt spid="311"/>
                                         </p:tgtEl>
                                         <p:attrNameLst>
                                           <p:attrName>style.visibility</p:attrName>
                                         </p:attrNameLst>
                                       </p:cBhvr>
-                                      <p:to>
-                                        <p:strVal val="visible"/>
-                                      </p:to>
-                                    </p:set>
+                                      <p:tavLst>
+                                        <p:tav tm="0">
+                                          <p:val>
+                                            <p:strVal val="hidden"/>
+                                          </p:val>
+                                        </p:tav>
+                                        <p:tav tm="50000">
+                                          <p:val>
+                                            <p:strVal val="visible"/>
+                                          </p:val>
+                                        </p:tav>
+                                      </p:tavLst>
+                                    </p:anim>
                                   </p:childTnLst>
                                 </p:cTn>
                               </p:par>
@@ -4381,7 +4726,7 @@
                                       <p:cBhvr>
                                         <p:cTn id="30" fill="hold"/>
                                         <p:tgtEl>
-                                          <p:spTgt spid="329"/>
+                                          <p:spTgt spid="340"/>
                                         </p:tgtEl>
                                         <p:attrNameLst>
                                           <p:attrName>style.visibility</p:attrName>
@@ -4413,34 +4758,28 @@
                             </p:stCondLst>
                             <p:childTnLst>
                               <p:par>
-                                <p:cTn id="33" presetClass="emph" nodeType="clickEffect" presetSubtype="0" presetID="35" grpId="8" repeatCount="4000" fill="hold">
+                                <p:cTn id="33" presetClass="entr" nodeType="clickEffect" presetSubtype="0" presetID="1" grpId="8" fill="hold">
                                   <p:stCondLst>
                                     <p:cond delay="0"/>
                                   </p:stCondLst>
+                                  <p:iterate type="el" backwards="0">
+                                    <p:tmAbs val="0"/>
+                                  </p:iterate>
                                   <p:childTnLst>
-                                    <p:anim calcmode="discrete" valueType="str">
+                                    <p:set>
                                       <p:cBhvr>
-                                        <p:cTn id="34" dur="1000" fill="hold"/>
+                                        <p:cTn id="34" fill="hold"/>
                                         <p:tgtEl>
-                                          <p:spTgt spid="316"/>
+                                          <p:spTgt spid="328"/>
                                         </p:tgtEl>
                                         <p:attrNameLst>
                                           <p:attrName>style.visibility</p:attrName>
                                         </p:attrNameLst>
                                       </p:cBhvr>
-                                      <p:tavLst>
-                                        <p:tav tm="0">
-                                          <p:val>
-                                            <p:strVal val="hidden"/>
-                                          </p:val>
-                                        </p:tav>
-                                        <p:tav tm="50000">
-                                          <p:val>
-                                            <p:strVal val="visible"/>
-                                          </p:val>
-                                        </p:tav>
-                                      </p:tavLst>
-                                    </p:anim>
+                                      <p:to>
+                                        <p:strVal val="visible"/>
+                                      </p:to>
+                                    </p:set>
                                   </p:childTnLst>
                                 </p:cTn>
                               </p:par>
@@ -4463,34 +4802,28 @@
                             </p:stCondLst>
                             <p:childTnLst>
                               <p:par>
-                                <p:cTn id="37" presetClass="emph" nodeType="clickEffect" presetSubtype="0" presetID="35" grpId="9" repeatCount="4000" fill="hold">
+                                <p:cTn id="37" presetClass="entr" nodeType="clickEffect" presetSubtype="0" presetID="1" grpId="9" fill="hold">
                                   <p:stCondLst>
                                     <p:cond delay="0"/>
                                   </p:stCondLst>
+                                  <p:iterate type="el" backwards="0">
+                                    <p:tmAbs val="0"/>
+                                  </p:iterate>
                                   <p:childTnLst>
-                                    <p:anim calcmode="discrete" valueType="str">
+                                    <p:set>
                                       <p:cBhvr>
-                                        <p:cTn id="38" dur="1000" fill="hold"/>
+                                        <p:cTn id="38" fill="hold"/>
                                         <p:tgtEl>
-                                          <p:spTgt spid="312"/>
+                                          <p:spTgt spid="329"/>
                                         </p:tgtEl>
                                         <p:attrNameLst>
                                           <p:attrName>style.visibility</p:attrName>
                                         </p:attrNameLst>
                                       </p:cBhvr>
-                                      <p:tavLst>
-                                        <p:tav tm="0">
-                                          <p:val>
-                                            <p:strVal val="hidden"/>
-                                          </p:val>
-                                        </p:tav>
-                                        <p:tav tm="50000">
-                                          <p:val>
-                                            <p:strVal val="visible"/>
-                                          </p:val>
-                                        </p:tav>
-                                      </p:tavLst>
-                                    </p:anim>
+                                      <p:to>
+                                        <p:strVal val="visible"/>
+                                      </p:to>
+                                    </p:set>
                                   </p:childTnLst>
                                 </p:cTn>
                               </p:par>
@@ -4513,34 +4846,28 @@
                             </p:stCondLst>
                             <p:childTnLst>
                               <p:par>
-                                <p:cTn id="41" presetClass="emph" nodeType="clickEffect" presetSubtype="0" presetID="35" grpId="10" repeatCount="4000" fill="hold">
+                                <p:cTn id="41" presetClass="entr" nodeType="clickEffect" presetSubtype="0" presetID="1" grpId="10" fill="hold">
                                   <p:stCondLst>
                                     <p:cond delay="0"/>
                                   </p:stCondLst>
+                                  <p:iterate type="el" backwards="0">
+                                    <p:tmAbs val="0"/>
+                                  </p:iterate>
                                   <p:childTnLst>
-                                    <p:anim calcmode="discrete" valueType="str">
+                                    <p:set>
                                       <p:cBhvr>
-                                        <p:cTn id="42" dur="1000" fill="hold"/>
+                                        <p:cTn id="42" fill="hold"/>
                                         <p:tgtEl>
-                                          <p:spTgt spid="315"/>
+                                          <p:spTgt spid="341"/>
                                         </p:tgtEl>
                                         <p:attrNameLst>
                                           <p:attrName>style.visibility</p:attrName>
                                         </p:attrNameLst>
                                       </p:cBhvr>
-                                      <p:tavLst>
-                                        <p:tav tm="0">
-                                          <p:val>
-                                            <p:strVal val="hidden"/>
-                                          </p:val>
-                                        </p:tav>
-                                        <p:tav tm="50000">
-                                          <p:val>
-                                            <p:strVal val="visible"/>
-                                          </p:val>
-                                        </p:tav>
-                                      </p:tavLst>
-                                    </p:anim>
+                                      <p:to>
+                                        <p:strVal val="visible"/>
+                                      </p:to>
+                                    </p:set>
                                   </p:childTnLst>
                                 </p:cTn>
                               </p:par>
@@ -4572,7 +4899,7 @@
                                       <p:cBhvr>
                                         <p:cTn id="46" dur="1000" fill="hold"/>
                                         <p:tgtEl>
-                                          <p:spTgt spid="311"/>
+                                          <p:spTgt spid="316"/>
                                         </p:tgtEl>
                                         <p:attrNameLst>
                                           <p:attrName>style.visibility</p:attrName>
@@ -4613,28 +4940,34 @@
                             </p:stCondLst>
                             <p:childTnLst>
                               <p:par>
-                                <p:cTn id="49" presetClass="entr" nodeType="clickEffect" presetSubtype="0" presetID="1" grpId="12" fill="hold">
+                                <p:cTn id="49" presetClass="emph" nodeType="clickEffect" presetSubtype="0" presetID="35" grpId="12" repeatCount="4000" fill="hold">
                                   <p:stCondLst>
                                     <p:cond delay="0"/>
                                   </p:stCondLst>
-                                  <p:iterate type="el" backwards="0">
-                                    <p:tmAbs val="0"/>
-                                  </p:iterate>
                                   <p:childTnLst>
-                                    <p:set>
+                                    <p:anim calcmode="discrete" valueType="str">
                                       <p:cBhvr>
-                                        <p:cTn id="50" fill="hold"/>
+                                        <p:cTn id="50" dur="1000" fill="hold"/>
                                         <p:tgtEl>
-                                          <p:spTgt spid="331"/>
+                                          <p:spTgt spid="312"/>
                                         </p:tgtEl>
                                         <p:attrNameLst>
                                           <p:attrName>style.visibility</p:attrName>
                                         </p:attrNameLst>
                                       </p:cBhvr>
-                                      <p:to>
-                                        <p:strVal val="visible"/>
-                                      </p:to>
-                                    </p:set>
+                                      <p:tavLst>
+                                        <p:tav tm="0">
+                                          <p:val>
+                                            <p:strVal val="hidden"/>
+                                          </p:val>
+                                        </p:tav>
+                                        <p:tav tm="50000">
+                                          <p:val>
+                                            <p:strVal val="visible"/>
+                                          </p:val>
+                                        </p:tav>
+                                      </p:tavLst>
+                                    </p:anim>
                                   </p:childTnLst>
                                 </p:cTn>
                               </p:par>
@@ -4657,28 +4990,34 @@
                             </p:stCondLst>
                             <p:childTnLst>
                               <p:par>
-                                <p:cTn id="53" presetClass="entr" nodeType="clickEffect" presetSubtype="0" presetID="1" grpId="13" fill="hold">
+                                <p:cTn id="53" presetClass="emph" nodeType="clickEffect" presetSubtype="0" presetID="35" grpId="13" repeatCount="4000" fill="hold">
                                   <p:stCondLst>
                                     <p:cond delay="0"/>
                                   </p:stCondLst>
-                                  <p:iterate type="el" backwards="0">
-                                    <p:tmAbs val="0"/>
-                                  </p:iterate>
                                   <p:childTnLst>
-                                    <p:set>
+                                    <p:anim calcmode="discrete" valueType="str">
                                       <p:cBhvr>
-                                        <p:cTn id="54" fill="hold"/>
+                                        <p:cTn id="54" dur="1000" fill="hold"/>
                                         <p:tgtEl>
-                                          <p:spTgt spid="332"/>
+                                          <p:spTgt spid="315"/>
                                         </p:tgtEl>
                                         <p:attrNameLst>
                                           <p:attrName>style.visibility</p:attrName>
                                         </p:attrNameLst>
                                       </p:cBhvr>
-                                      <p:to>
-                                        <p:strVal val="visible"/>
-                                      </p:to>
-                                    </p:set>
+                                      <p:tavLst>
+                                        <p:tav tm="0">
+                                          <p:val>
+                                            <p:strVal val="hidden"/>
+                                          </p:val>
+                                        </p:tav>
+                                        <p:tav tm="50000">
+                                          <p:val>
+                                            <p:strVal val="visible"/>
+                                          </p:val>
+                                        </p:tav>
+                                      </p:tavLst>
+                                    </p:anim>
                                   </p:childTnLst>
                                 </p:cTn>
                               </p:par>
@@ -4710,7 +5049,7 @@
                                       <p:cBhvr>
                                         <p:cTn id="58" dur="1000" fill="hold"/>
                                         <p:tgtEl>
-                                          <p:spTgt spid="313"/>
+                                          <p:spTgt spid="311"/>
                                         </p:tgtEl>
                                         <p:attrNameLst>
                                           <p:attrName>style.visibility</p:attrName>
@@ -4751,34 +5090,28 @@
                             </p:stCondLst>
                             <p:childTnLst>
                               <p:par>
-                                <p:cTn id="61" presetClass="emph" nodeType="clickEffect" presetSubtype="0" presetID="35" grpId="15" repeatCount="4000" fill="hold">
+                                <p:cTn id="61" presetClass="entr" nodeType="clickEffect" presetSubtype="0" presetID="1" grpId="15" fill="hold">
                                   <p:stCondLst>
                                     <p:cond delay="0"/>
                                   </p:stCondLst>
+                                  <p:iterate type="el" backwards="0">
+                                    <p:tmAbs val="0"/>
+                                  </p:iterate>
                                   <p:childTnLst>
-                                    <p:anim calcmode="discrete" valueType="str">
+                                    <p:set>
                                       <p:cBhvr>
-                                        <p:cTn id="62" dur="1000" fill="hold"/>
+                                        <p:cTn id="62" fill="hold"/>
                                         <p:tgtEl>
-                                          <p:spTgt spid="309"/>
+                                          <p:spTgt spid="331"/>
                                         </p:tgtEl>
                                         <p:attrNameLst>
                                           <p:attrName>style.visibility</p:attrName>
                                         </p:attrNameLst>
                                       </p:cBhvr>
-                                      <p:tavLst>
-                                        <p:tav tm="0">
-                                          <p:val>
-                                            <p:strVal val="hidden"/>
-                                          </p:val>
-                                        </p:tav>
-                                        <p:tav tm="50000">
-                                          <p:val>
-                                            <p:strVal val="visible"/>
-                                          </p:val>
-                                        </p:tav>
-                                      </p:tavLst>
-                                    </p:anim>
+                                      <p:to>
+                                        <p:strVal val="visible"/>
+                                      </p:to>
+                                    </p:set>
                                   </p:childTnLst>
                                 </p:cTn>
                               </p:par>
@@ -4801,34 +5134,28 @@
                             </p:stCondLst>
                             <p:childTnLst>
                               <p:par>
-                                <p:cTn id="65" presetClass="emph" nodeType="clickEffect" presetSubtype="0" presetID="35" grpId="16" repeatCount="4000" fill="hold">
+                                <p:cTn id="65" presetClass="entr" nodeType="clickEffect" presetSubtype="0" presetID="1" grpId="16" fill="hold">
                                   <p:stCondLst>
                                     <p:cond delay="0"/>
                                   </p:stCondLst>
+                                  <p:iterate type="el" backwards="0">
+                                    <p:tmAbs val="0"/>
+                                  </p:iterate>
                                   <p:childTnLst>
-                                    <p:anim calcmode="discrete" valueType="str">
+                                    <p:set>
                                       <p:cBhvr>
-                                        <p:cTn id="66" dur="1000" fill="hold"/>
+                                        <p:cTn id="66" fill="hold"/>
                                         <p:tgtEl>
-                                          <p:spTgt spid="312"/>
+                                          <p:spTgt spid="332"/>
                                         </p:tgtEl>
                                         <p:attrNameLst>
                                           <p:attrName>style.visibility</p:attrName>
                                         </p:attrNameLst>
                                       </p:cBhvr>
-                                      <p:tavLst>
-                                        <p:tav tm="0">
-                                          <p:val>
-                                            <p:strVal val="hidden"/>
-                                          </p:val>
-                                        </p:tav>
-                                        <p:tav tm="50000">
-                                          <p:val>
-                                            <p:strVal val="visible"/>
-                                          </p:val>
-                                        </p:tav>
-                                      </p:tavLst>
-                                    </p:anim>
+                                      <p:to>
+                                        <p:strVal val="visible"/>
+                                      </p:to>
+                                    </p:set>
                                   </p:childTnLst>
                                 </p:cTn>
                               </p:par>
@@ -4851,34 +5178,28 @@
                             </p:stCondLst>
                             <p:childTnLst>
                               <p:par>
-                                <p:cTn id="69" presetClass="emph" nodeType="clickEffect" presetSubtype="0" presetID="35" grpId="17" repeatCount="4000" fill="hold">
+                                <p:cTn id="69" presetClass="entr" nodeType="clickEffect" presetSubtype="0" presetID="1" grpId="17" fill="hold">
                                   <p:stCondLst>
                                     <p:cond delay="0"/>
                                   </p:stCondLst>
+                                  <p:iterate type="el" backwards="0">
+                                    <p:tmAbs val="0"/>
+                                  </p:iterate>
                                   <p:childTnLst>
-                                    <p:anim calcmode="discrete" valueType="str">
+                                    <p:set>
                                       <p:cBhvr>
-                                        <p:cTn id="70" dur="1000" fill="hold"/>
+                                        <p:cTn id="70" fill="hold"/>
                                         <p:tgtEl>
-                                          <p:spTgt spid="315"/>
+                                          <p:spTgt spid="342"/>
                                         </p:tgtEl>
                                         <p:attrNameLst>
                                           <p:attrName>style.visibility</p:attrName>
                                         </p:attrNameLst>
                                       </p:cBhvr>
-                                      <p:tavLst>
-                                        <p:tav tm="0">
-                                          <p:val>
-                                            <p:strVal val="hidden"/>
-                                          </p:val>
-                                        </p:tav>
-                                        <p:tav tm="50000">
-                                          <p:val>
-                                            <p:strVal val="visible"/>
-                                          </p:val>
-                                        </p:tav>
-                                      </p:tavLst>
-                                    </p:anim>
+                                      <p:to>
+                                        <p:strVal val="visible"/>
+                                      </p:to>
+                                    </p:set>
                                   </p:childTnLst>
                                 </p:cTn>
                               </p:par>
@@ -4910,7 +5231,7 @@
                                       <p:cBhvr>
                                         <p:cTn id="74" dur="1000" fill="hold"/>
                                         <p:tgtEl>
-                                          <p:spTgt spid="311"/>
+                                          <p:spTgt spid="313"/>
                                         </p:tgtEl>
                                         <p:attrNameLst>
                                           <p:attrName>style.visibility</p:attrName>
@@ -4951,28 +5272,34 @@
                             </p:stCondLst>
                             <p:childTnLst>
                               <p:par>
-                                <p:cTn id="77" presetClass="entr" nodeType="clickEffect" presetSubtype="0" presetID="1" grpId="19" fill="hold">
+                                <p:cTn id="77" presetClass="emph" nodeType="clickEffect" presetSubtype="0" presetID="35" grpId="19" repeatCount="4000" fill="hold">
                                   <p:stCondLst>
                                     <p:cond delay="0"/>
                                   </p:stCondLst>
-                                  <p:iterate type="el" backwards="0">
-                                    <p:tmAbs val="0"/>
-                                  </p:iterate>
                                   <p:childTnLst>
-                                    <p:set>
+                                    <p:anim calcmode="discrete" valueType="str">
                                       <p:cBhvr>
-                                        <p:cTn id="78" fill="hold"/>
+                                        <p:cTn id="78" dur="1000" fill="hold"/>
                                         <p:tgtEl>
-                                          <p:spTgt spid="333"/>
+                                          <p:spTgt spid="309"/>
                                         </p:tgtEl>
                                         <p:attrNameLst>
                                           <p:attrName>style.visibility</p:attrName>
                                         </p:attrNameLst>
                                       </p:cBhvr>
-                                      <p:to>
-                                        <p:strVal val="visible"/>
-                                      </p:to>
-                                    </p:set>
+                                      <p:tavLst>
+                                        <p:tav tm="0">
+                                          <p:val>
+                                            <p:strVal val="hidden"/>
+                                          </p:val>
+                                        </p:tav>
+                                        <p:tav tm="50000">
+                                          <p:val>
+                                            <p:strVal val="visible"/>
+                                          </p:val>
+                                        </p:tav>
+                                      </p:tavLst>
+                                    </p:anim>
                                   </p:childTnLst>
                                 </p:cTn>
                               </p:par>
@@ -4995,28 +5322,34 @@
                             </p:stCondLst>
                             <p:childTnLst>
                               <p:par>
-                                <p:cTn id="81" presetClass="entr" nodeType="clickEffect" presetSubtype="0" presetID="1" grpId="20" fill="hold">
+                                <p:cTn id="81" presetClass="emph" nodeType="clickEffect" presetSubtype="0" presetID="35" grpId="20" repeatCount="4000" fill="hold">
                                   <p:stCondLst>
                                     <p:cond delay="0"/>
                                   </p:stCondLst>
-                                  <p:iterate type="el" backwards="0">
-                                    <p:tmAbs val="0"/>
-                                  </p:iterate>
                                   <p:childTnLst>
-                                    <p:set>
+                                    <p:anim calcmode="discrete" valueType="str">
                                       <p:cBhvr>
-                                        <p:cTn id="82" fill="hold"/>
+                                        <p:cTn id="82" dur="1000" fill="hold"/>
                                         <p:tgtEl>
-                                          <p:spTgt spid="334"/>
+                                          <p:spTgt spid="312"/>
                                         </p:tgtEl>
                                         <p:attrNameLst>
                                           <p:attrName>style.visibility</p:attrName>
                                         </p:attrNameLst>
                                       </p:cBhvr>
-                                      <p:to>
-                                        <p:strVal val="visible"/>
-                                      </p:to>
-                                    </p:set>
+                                      <p:tavLst>
+                                        <p:tav tm="0">
+                                          <p:val>
+                                            <p:strVal val="hidden"/>
+                                          </p:val>
+                                        </p:tav>
+                                        <p:tav tm="50000">
+                                          <p:val>
+                                            <p:strVal val="visible"/>
+                                          </p:val>
+                                        </p:tav>
+                                      </p:tavLst>
+                                    </p:anim>
                                   </p:childTnLst>
                                 </p:cTn>
                               </p:par>
@@ -5048,7 +5381,7 @@
                                       <p:cBhvr>
                                         <p:cTn id="86" dur="1000" fill="hold"/>
                                         <p:tgtEl>
-                                          <p:spTgt spid="313"/>
+                                          <p:spTgt spid="315"/>
                                         </p:tgtEl>
                                         <p:attrNameLst>
                                           <p:attrName>style.visibility</p:attrName>
@@ -5098,7 +5431,7 @@
                                       <p:cBhvr>
                                         <p:cTn id="90" dur="1000" fill="hold"/>
                                         <p:tgtEl>
-                                          <p:spTgt spid="314"/>
+                                          <p:spTgt spid="311"/>
                                         </p:tgtEl>
                                         <p:attrNameLst>
                                           <p:attrName>style.visibility</p:attrName>
@@ -5139,34 +5472,28 @@
                             </p:stCondLst>
                             <p:childTnLst>
                               <p:par>
-                                <p:cTn id="93" presetClass="emph" nodeType="clickEffect" presetSubtype="0" presetID="35" grpId="23" repeatCount="4000" fill="hold">
+                                <p:cTn id="93" presetClass="entr" nodeType="clickEffect" presetSubtype="0" presetID="1" grpId="23" fill="hold">
                                   <p:stCondLst>
                                     <p:cond delay="0"/>
                                   </p:stCondLst>
+                                  <p:iterate type="el" backwards="0">
+                                    <p:tmAbs val="0"/>
+                                  </p:iterate>
                                   <p:childTnLst>
-                                    <p:anim calcmode="discrete" valueType="str">
+                                    <p:set>
                                       <p:cBhvr>
-                                        <p:cTn id="94" dur="1000" fill="hold"/>
+                                        <p:cTn id="94" fill="hold"/>
                                         <p:tgtEl>
-                                          <p:spTgt spid="317"/>
+                                          <p:spTgt spid="333"/>
                                         </p:tgtEl>
                                         <p:attrNameLst>
                                           <p:attrName>style.visibility</p:attrName>
                                         </p:attrNameLst>
                                       </p:cBhvr>
-                                      <p:tavLst>
-                                        <p:tav tm="0">
-                                          <p:val>
-                                            <p:strVal val="hidden"/>
-                                          </p:val>
-                                        </p:tav>
-                                        <p:tav tm="50000">
-                                          <p:val>
-                                            <p:strVal val="visible"/>
-                                          </p:val>
-                                        </p:tav>
-                                      </p:tavLst>
-                                    </p:anim>
+                                      <p:to>
+                                        <p:strVal val="visible"/>
+                                      </p:to>
+                                    </p:set>
                                   </p:childTnLst>
                                 </p:cTn>
                               </p:par>
@@ -5189,34 +5516,28 @@
                             </p:stCondLst>
                             <p:childTnLst>
                               <p:par>
-                                <p:cTn id="97" presetClass="emph" nodeType="clickEffect" presetSubtype="0" presetID="35" grpId="24" repeatCount="4000" fill="hold">
+                                <p:cTn id="97" presetClass="entr" nodeType="clickEffect" presetSubtype="0" presetID="1" grpId="24" fill="hold">
                                   <p:stCondLst>
                                     <p:cond delay="0"/>
                                   </p:stCondLst>
+                                  <p:iterate type="el" backwards="0">
+                                    <p:tmAbs val="0"/>
+                                  </p:iterate>
                                   <p:childTnLst>
-                                    <p:anim calcmode="discrete" valueType="str">
+                                    <p:set>
                                       <p:cBhvr>
-                                        <p:cTn id="98" dur="1000" fill="hold"/>
+                                        <p:cTn id="98" fill="hold"/>
                                         <p:tgtEl>
-                                          <p:spTgt spid="311"/>
+                                          <p:spTgt spid="334"/>
                                         </p:tgtEl>
                                         <p:attrNameLst>
                                           <p:attrName>style.visibility</p:attrName>
                                         </p:attrNameLst>
                                       </p:cBhvr>
-                                      <p:tavLst>
-                                        <p:tav tm="0">
-                                          <p:val>
-                                            <p:strVal val="hidden"/>
-                                          </p:val>
-                                        </p:tav>
-                                        <p:tav tm="50000">
-                                          <p:val>
-                                            <p:strVal val="visible"/>
-                                          </p:val>
-                                        </p:tav>
-                                      </p:tavLst>
-                                    </p:anim>
+                                      <p:to>
+                                        <p:strVal val="visible"/>
+                                      </p:to>
+                                    </p:set>
                                   </p:childTnLst>
                                 </p:cTn>
                               </p:par>
@@ -5251,7 +5572,7 @@
                                       <p:cBhvr>
                                         <p:cTn id="102" fill="hold"/>
                                         <p:tgtEl>
-                                          <p:spTgt spid="335"/>
+                                          <p:spTgt spid="343"/>
                                         </p:tgtEl>
                                         <p:attrNameLst>
                                           <p:attrName>style.visibility</p:attrName>
@@ -5283,28 +5604,34 @@
                             </p:stCondLst>
                             <p:childTnLst>
                               <p:par>
-                                <p:cTn id="105" presetClass="entr" nodeType="clickEffect" presetSubtype="0" presetID="1" grpId="26" fill="hold">
+                                <p:cTn id="105" presetClass="emph" nodeType="clickEffect" presetSubtype="0" presetID="35" grpId="26" repeatCount="4000" fill="hold">
                                   <p:stCondLst>
                                     <p:cond delay="0"/>
                                   </p:stCondLst>
-                                  <p:iterate type="el" backwards="0">
-                                    <p:tmAbs val="0"/>
-                                  </p:iterate>
                                   <p:childTnLst>
-                                    <p:set>
+                                    <p:anim calcmode="discrete" valueType="str">
                                       <p:cBhvr>
-                                        <p:cTn id="106" fill="hold"/>
+                                        <p:cTn id="106" dur="1000" fill="hold"/>
                                         <p:tgtEl>
-                                          <p:spTgt spid="336"/>
+                                          <p:spTgt spid="313"/>
                                         </p:tgtEl>
                                         <p:attrNameLst>
                                           <p:attrName>style.visibility</p:attrName>
                                         </p:attrNameLst>
                                       </p:cBhvr>
-                                      <p:to>
-                                        <p:strVal val="visible"/>
-                                      </p:to>
-                                    </p:set>
+                                      <p:tavLst>
+                                        <p:tav tm="0">
+                                          <p:val>
+                                            <p:strVal val="hidden"/>
+                                          </p:val>
+                                        </p:tav>
+                                        <p:tav tm="50000">
+                                          <p:val>
+                                            <p:strVal val="visible"/>
+                                          </p:val>
+                                        </p:tav>
+                                      </p:tavLst>
+                                    </p:anim>
                                   </p:childTnLst>
                                 </p:cTn>
                               </p:par>
@@ -5336,7 +5663,7 @@
                                       <p:cBhvr>
                                         <p:cTn id="110" dur="1000" fill="hold"/>
                                         <p:tgtEl>
-                                          <p:spTgt spid="313"/>
+                                          <p:spTgt spid="314"/>
                                         </p:tgtEl>
                                         <p:attrNameLst>
                                           <p:attrName>style.visibility</p:attrName>
@@ -5386,7 +5713,7 @@
                                       <p:cBhvr>
                                         <p:cTn id="114" dur="1000" fill="hold"/>
                                         <p:tgtEl>
-                                          <p:spTgt spid="314"/>
+                                          <p:spTgt spid="317"/>
                                         </p:tgtEl>
                                         <p:attrNameLst>
                                           <p:attrName>style.visibility</p:attrName>
@@ -5436,7 +5763,7 @@
                                       <p:cBhvr>
                                         <p:cTn id="118" dur="1000" fill="hold"/>
                                         <p:tgtEl>
-                                          <p:spTgt spid="310"/>
+                                          <p:spTgt spid="311"/>
                                         </p:tgtEl>
                                         <p:attrNameLst>
                                           <p:attrName>style.visibility</p:attrName>
@@ -5489,7 +5816,7 @@
                                       <p:cBhvr>
                                         <p:cTn id="122" fill="hold"/>
                                         <p:tgtEl>
-                                          <p:spTgt spid="337"/>
+                                          <p:spTgt spid="335"/>
                                         </p:tgtEl>
                                         <p:attrNameLst>
                                           <p:attrName>style.visibility</p:attrName>
@@ -5533,7 +5860,7 @@
                                       <p:cBhvr>
                                         <p:cTn id="126" fill="hold"/>
                                         <p:tgtEl>
-                                          <p:spTgt spid="338"/>
+                                          <p:spTgt spid="336"/>
                                         </p:tgtEl>
                                         <p:attrNameLst>
                                           <p:attrName>style.visibility</p:attrName>
@@ -5565,7 +5892,333 @@
                             </p:stCondLst>
                             <p:childTnLst>
                               <p:par>
-                                <p:cTn id="129" presetClass="exit" nodeType="clickEffect" presetSubtype="2" presetID="2" grpId="32" fill="hold">
+                                <p:cTn id="129" presetClass="entr" nodeType="clickEffect" presetSubtype="0" presetID="1" grpId="32" fill="hold">
+                                  <p:stCondLst>
+                                    <p:cond delay="0"/>
+                                  </p:stCondLst>
+                                  <p:iterate type="el" backwards="0">
+                                    <p:tmAbs val="0"/>
+                                  </p:iterate>
+                                  <p:childTnLst>
+                                    <p:set>
+                                      <p:cBhvr>
+                                        <p:cTn id="130" fill="hold"/>
+                                        <p:tgtEl>
+                                          <p:spTgt spid="344"/>
+                                        </p:tgtEl>
+                                        <p:attrNameLst>
+                                          <p:attrName>style.visibility</p:attrName>
+                                        </p:attrNameLst>
+                                      </p:cBhvr>
+                                      <p:to>
+                                        <p:strVal val="visible"/>
+                                      </p:to>
+                                    </p:set>
+                                  </p:childTnLst>
+                                </p:cTn>
+                              </p:par>
+                            </p:childTnLst>
+                          </p:cTn>
+                        </p:par>
+                      </p:childTnLst>
+                    </p:cTn>
+                  </p:par>
+                  <p:par>
+                    <p:cTn id="131" fill="hold">
+                      <p:stCondLst>
+                        <p:cond delay="indefinite"/>
+                      </p:stCondLst>
+                      <p:childTnLst>
+                        <p:par>
+                          <p:cTn id="132" fill="hold">
+                            <p:stCondLst>
+                              <p:cond delay="0"/>
+                            </p:stCondLst>
+                            <p:childTnLst>
+                              <p:par>
+                                <p:cTn id="133" presetClass="emph" nodeType="clickEffect" presetSubtype="0" presetID="35" grpId="33" repeatCount="4000" fill="hold">
+                                  <p:stCondLst>
+                                    <p:cond delay="0"/>
+                                  </p:stCondLst>
+                                  <p:childTnLst>
+                                    <p:anim calcmode="discrete" valueType="str">
+                                      <p:cBhvr>
+                                        <p:cTn id="134" dur="1000" fill="hold"/>
+                                        <p:tgtEl>
+                                          <p:spTgt spid="313"/>
+                                        </p:tgtEl>
+                                        <p:attrNameLst>
+                                          <p:attrName>style.visibility</p:attrName>
+                                        </p:attrNameLst>
+                                      </p:cBhvr>
+                                      <p:tavLst>
+                                        <p:tav tm="0">
+                                          <p:val>
+                                            <p:strVal val="hidden"/>
+                                          </p:val>
+                                        </p:tav>
+                                        <p:tav tm="50000">
+                                          <p:val>
+                                            <p:strVal val="visible"/>
+                                          </p:val>
+                                        </p:tav>
+                                      </p:tavLst>
+                                    </p:anim>
+                                  </p:childTnLst>
+                                </p:cTn>
+                              </p:par>
+                            </p:childTnLst>
+                          </p:cTn>
+                        </p:par>
+                      </p:childTnLst>
+                    </p:cTn>
+                  </p:par>
+                  <p:par>
+                    <p:cTn id="135" fill="hold">
+                      <p:stCondLst>
+                        <p:cond delay="indefinite"/>
+                      </p:stCondLst>
+                      <p:childTnLst>
+                        <p:par>
+                          <p:cTn id="136" fill="hold">
+                            <p:stCondLst>
+                              <p:cond delay="0"/>
+                            </p:stCondLst>
+                            <p:childTnLst>
+                              <p:par>
+                                <p:cTn id="137" presetClass="emph" nodeType="clickEffect" presetSubtype="0" presetID="35" grpId="34" repeatCount="4000" fill="hold">
+                                  <p:stCondLst>
+                                    <p:cond delay="0"/>
+                                  </p:stCondLst>
+                                  <p:childTnLst>
+                                    <p:anim calcmode="discrete" valueType="str">
+                                      <p:cBhvr>
+                                        <p:cTn id="138" dur="1000" fill="hold"/>
+                                        <p:tgtEl>
+                                          <p:spTgt spid="314"/>
+                                        </p:tgtEl>
+                                        <p:attrNameLst>
+                                          <p:attrName>style.visibility</p:attrName>
+                                        </p:attrNameLst>
+                                      </p:cBhvr>
+                                      <p:tavLst>
+                                        <p:tav tm="0">
+                                          <p:val>
+                                            <p:strVal val="hidden"/>
+                                          </p:val>
+                                        </p:tav>
+                                        <p:tav tm="50000">
+                                          <p:val>
+                                            <p:strVal val="visible"/>
+                                          </p:val>
+                                        </p:tav>
+                                      </p:tavLst>
+                                    </p:anim>
+                                  </p:childTnLst>
+                                </p:cTn>
+                              </p:par>
+                            </p:childTnLst>
+                          </p:cTn>
+                        </p:par>
+                      </p:childTnLst>
+                    </p:cTn>
+                  </p:par>
+                  <p:par>
+                    <p:cTn id="139" fill="hold">
+                      <p:stCondLst>
+                        <p:cond delay="indefinite"/>
+                      </p:stCondLst>
+                      <p:childTnLst>
+                        <p:par>
+                          <p:cTn id="140" fill="hold">
+                            <p:stCondLst>
+                              <p:cond delay="0"/>
+                            </p:stCondLst>
+                            <p:childTnLst>
+                              <p:par>
+                                <p:cTn id="141" presetClass="emph" nodeType="clickEffect" presetSubtype="0" presetID="35" grpId="35" repeatCount="4000" fill="hold">
+                                  <p:stCondLst>
+                                    <p:cond delay="0"/>
+                                  </p:stCondLst>
+                                  <p:childTnLst>
+                                    <p:anim calcmode="discrete" valueType="str">
+                                      <p:cBhvr>
+                                        <p:cTn id="142" dur="1000" fill="hold"/>
+                                        <p:tgtEl>
+                                          <p:spTgt spid="310"/>
+                                        </p:tgtEl>
+                                        <p:attrNameLst>
+                                          <p:attrName>style.visibility</p:attrName>
+                                        </p:attrNameLst>
+                                      </p:cBhvr>
+                                      <p:tavLst>
+                                        <p:tav tm="0">
+                                          <p:val>
+                                            <p:strVal val="hidden"/>
+                                          </p:val>
+                                        </p:tav>
+                                        <p:tav tm="50000">
+                                          <p:val>
+                                            <p:strVal val="visible"/>
+                                          </p:val>
+                                        </p:tav>
+                                      </p:tavLst>
+                                    </p:anim>
+                                  </p:childTnLst>
+                                </p:cTn>
+                              </p:par>
+                            </p:childTnLst>
+                          </p:cTn>
+                        </p:par>
+                      </p:childTnLst>
+                    </p:cTn>
+                  </p:par>
+                  <p:par>
+                    <p:cTn id="143" fill="hold">
+                      <p:stCondLst>
+                        <p:cond delay="indefinite"/>
+                      </p:stCondLst>
+                      <p:childTnLst>
+                        <p:par>
+                          <p:cTn id="144" fill="hold">
+                            <p:stCondLst>
+                              <p:cond delay="0"/>
+                            </p:stCondLst>
+                            <p:childTnLst>
+                              <p:par>
+                                <p:cTn id="145" presetClass="entr" nodeType="clickEffect" presetSubtype="0" presetID="1" grpId="36" fill="hold">
+                                  <p:stCondLst>
+                                    <p:cond delay="0"/>
+                                  </p:stCondLst>
+                                  <p:iterate type="el" backwards="0">
+                                    <p:tmAbs val="0"/>
+                                  </p:iterate>
+                                  <p:childTnLst>
+                                    <p:set>
+                                      <p:cBhvr>
+                                        <p:cTn id="146" fill="hold"/>
+                                        <p:tgtEl>
+                                          <p:spTgt spid="337"/>
+                                        </p:tgtEl>
+                                        <p:attrNameLst>
+                                          <p:attrName>style.visibility</p:attrName>
+                                        </p:attrNameLst>
+                                      </p:cBhvr>
+                                      <p:to>
+                                        <p:strVal val="visible"/>
+                                      </p:to>
+                                    </p:set>
+                                  </p:childTnLst>
+                                </p:cTn>
+                              </p:par>
+                            </p:childTnLst>
+                          </p:cTn>
+                        </p:par>
+                      </p:childTnLst>
+                    </p:cTn>
+                  </p:par>
+                  <p:par>
+                    <p:cTn id="147" fill="hold">
+                      <p:stCondLst>
+                        <p:cond delay="indefinite"/>
+                      </p:stCondLst>
+                      <p:childTnLst>
+                        <p:par>
+                          <p:cTn id="148" fill="hold">
+                            <p:stCondLst>
+                              <p:cond delay="0"/>
+                            </p:stCondLst>
+                            <p:childTnLst>
+                              <p:par>
+                                <p:cTn id="149" presetClass="entr" nodeType="clickEffect" presetSubtype="0" presetID="1" grpId="37" fill="hold">
+                                  <p:stCondLst>
+                                    <p:cond delay="0"/>
+                                  </p:stCondLst>
+                                  <p:iterate type="el" backwards="0">
+                                    <p:tmAbs val="0"/>
+                                  </p:iterate>
+                                  <p:childTnLst>
+                                    <p:set>
+                                      <p:cBhvr>
+                                        <p:cTn id="150" fill="hold"/>
+                                        <p:tgtEl>
+                                          <p:spTgt spid="338"/>
+                                        </p:tgtEl>
+                                        <p:attrNameLst>
+                                          <p:attrName>style.visibility</p:attrName>
+                                        </p:attrNameLst>
+                                      </p:cBhvr>
+                                      <p:to>
+                                        <p:strVal val="visible"/>
+                                      </p:to>
+                                    </p:set>
+                                  </p:childTnLst>
+                                </p:cTn>
+                              </p:par>
+                            </p:childTnLst>
+                          </p:cTn>
+                        </p:par>
+                      </p:childTnLst>
+                    </p:cTn>
+                  </p:par>
+                  <p:par>
+                    <p:cTn id="151" fill="hold">
+                      <p:stCondLst>
+                        <p:cond delay="indefinite"/>
+                      </p:stCondLst>
+                      <p:childTnLst>
+                        <p:par>
+                          <p:cTn id="152" fill="hold">
+                            <p:stCondLst>
+                              <p:cond delay="0"/>
+                            </p:stCondLst>
+                            <p:childTnLst>
+                              <p:par>
+                                <p:cTn id="153" presetClass="entr" nodeType="clickEffect" presetSubtype="0" presetID="1" grpId="38" fill="hold">
+                                  <p:stCondLst>
+                                    <p:cond delay="0"/>
+                                  </p:stCondLst>
+                                  <p:iterate type="el" backwards="0">
+                                    <p:tmAbs val="0"/>
+                                  </p:iterate>
+                                  <p:childTnLst>
+                                    <p:set>
+                                      <p:cBhvr>
+                                        <p:cTn id="154" fill="hold"/>
+                                        <p:tgtEl>
+                                          <p:spTgt spid="345"/>
+                                        </p:tgtEl>
+                                        <p:attrNameLst>
+                                          <p:attrName>style.visibility</p:attrName>
+                                        </p:attrNameLst>
+                                      </p:cBhvr>
+                                      <p:to>
+                                        <p:strVal val="visible"/>
+                                      </p:to>
+                                    </p:set>
+                                  </p:childTnLst>
+                                </p:cTn>
+                              </p:par>
+                            </p:childTnLst>
+                          </p:cTn>
+                        </p:par>
+                      </p:childTnLst>
+                    </p:cTn>
+                  </p:par>
+                  <p:par>
+                    <p:cTn id="155" fill="hold">
+                      <p:stCondLst>
+                        <p:cond delay="indefinite"/>
+                      </p:stCondLst>
+                      <p:childTnLst>
+                        <p:par>
+                          <p:cTn id="156" fill="hold">
+                            <p:stCondLst>
+                              <p:cond delay="0"/>
+                            </p:stCondLst>
+                            <p:childTnLst>
+                              <p:par>
+                                <p:cTn id="157" presetClass="exit" nodeType="clickEffect" presetSubtype="2" presetID="2" grpId="39" fill="hold">
                                   <p:stCondLst>
                                     <p:cond delay="0"/>
                                   </p:stCondLst>
@@ -5575,7 +6228,7 @@
                                   <p:childTnLst>
                                     <p:anim calcmode="lin" valueType="num">
                                       <p:cBhvr>
-                                        <p:cTn id="130" dur="1000" fill="hold"/>
+                                        <p:cTn id="158" dur="1000" fill="hold"/>
                                         <p:tgtEl>
                                           <p:spTgt spid="312"/>
                                         </p:tgtEl>
@@ -5598,7 +6251,7 @@
                                     </p:anim>
                                     <p:anim calcmode="lin" valueType="num">
                                       <p:cBhvr>
-                                        <p:cTn id="131" dur="1000" fill="hold"/>
+                                        <p:cTn id="159" dur="1000" fill="hold"/>
                                         <p:tgtEl>
                                           <p:spTgt spid="312"/>
                                         </p:tgtEl>
@@ -5621,7 +6274,7 @@
                                     </p:anim>
                                     <p:set>
                                       <p:cBhvr>
-                                        <p:cTn id="132" fill="hold">
+                                        <p:cTn id="160" fill="hold">
                                           <p:stCondLst>
                                             <p:cond delay="999"/>
                                           </p:stCondLst>
@@ -5647,19 +6300,19 @@
                     </p:cTn>
                   </p:par>
                   <p:par>
-                    <p:cTn id="133" fill="hold">
+                    <p:cTn id="161" fill="hold">
                       <p:stCondLst>
                         <p:cond delay="indefinite"/>
                       </p:stCondLst>
                       <p:childTnLst>
                         <p:par>
-                          <p:cTn id="134" fill="hold">
+                          <p:cTn id="162" fill="hold">
                             <p:stCondLst>
                               <p:cond delay="0"/>
                             </p:stCondLst>
                             <p:childTnLst>
                               <p:par>
-                                <p:cTn id="135" presetClass="exit" nodeType="clickEffect" presetSubtype="2" presetID="2" grpId="33" fill="hold">
+                                <p:cTn id="163" presetClass="exit" nodeType="clickEffect" presetSubtype="2" presetID="2" grpId="40" fill="hold">
                                   <p:stCondLst>
                                     <p:cond delay="0"/>
                                   </p:stCondLst>
@@ -5669,7 +6322,7 @@
                                   <p:childTnLst>
                                     <p:anim calcmode="lin" valueType="num">
                                       <p:cBhvr>
-                                        <p:cTn id="136" dur="1000" fill="hold"/>
+                                        <p:cTn id="164" dur="1000" fill="hold"/>
                                         <p:tgtEl>
                                           <p:spTgt spid="315"/>
                                         </p:tgtEl>
@@ -5692,7 +6345,7 @@
                                     </p:anim>
                                     <p:anim calcmode="lin" valueType="num">
                                       <p:cBhvr>
-                                        <p:cTn id="137" dur="1000" fill="hold"/>
+                                        <p:cTn id="165" dur="1000" fill="hold"/>
                                         <p:tgtEl>
                                           <p:spTgt spid="315"/>
                                         </p:tgtEl>
@@ -5715,7 +6368,7 @@
                                     </p:anim>
                                     <p:set>
                                       <p:cBhvr>
-                                        <p:cTn id="138" fill="hold">
+                                        <p:cTn id="166" fill="hold">
                                           <p:stCondLst>
                                             <p:cond delay="999"/>
                                           </p:stCondLst>
@@ -5741,19 +6394,19 @@
                     </p:cTn>
                   </p:par>
                   <p:par>
-                    <p:cTn id="139" fill="hold">
+                    <p:cTn id="167" fill="hold">
                       <p:stCondLst>
                         <p:cond delay="indefinite"/>
                       </p:stCondLst>
                       <p:childTnLst>
                         <p:par>
-                          <p:cTn id="140" fill="hold">
+                          <p:cTn id="168" fill="hold">
                             <p:stCondLst>
                               <p:cond delay="0"/>
                             </p:stCondLst>
                             <p:childTnLst>
                               <p:par>
-                                <p:cTn id="141" presetClass="exit" nodeType="clickEffect" presetSubtype="2" presetID="2" grpId="34" fill="hold">
+                                <p:cTn id="169" presetClass="exit" nodeType="clickEffect" presetSubtype="2" presetID="2" grpId="41" fill="hold">
                                   <p:stCondLst>
                                     <p:cond delay="0"/>
                                   </p:stCondLst>
@@ -5763,7 +6416,7 @@
                                   <p:childTnLst>
                                     <p:anim calcmode="lin" valueType="num">
                                       <p:cBhvr>
-                                        <p:cTn id="142" dur="1000" fill="hold"/>
+                                        <p:cTn id="170" dur="1000" fill="hold"/>
                                         <p:tgtEl>
                                           <p:spTgt spid="311"/>
                                         </p:tgtEl>
@@ -5786,7 +6439,7 @@
                                     </p:anim>
                                     <p:anim calcmode="lin" valueType="num">
                                       <p:cBhvr>
-                                        <p:cTn id="143" dur="1000" fill="hold"/>
+                                        <p:cTn id="171" dur="1000" fill="hold"/>
                                         <p:tgtEl>
                                           <p:spTgt spid="311"/>
                                         </p:tgtEl>
@@ -5809,7 +6462,7 @@
                                     </p:anim>
                                     <p:set>
                                       <p:cBhvr>
-                                        <p:cTn id="144" fill="hold">
+                                        <p:cTn id="172" fill="hold">
                                           <p:stCondLst>
                                             <p:cond delay="999"/>
                                           </p:stCondLst>
@@ -5835,19 +6488,19 @@
                     </p:cTn>
                   </p:par>
                   <p:par>
-                    <p:cTn id="145" fill="hold">
+                    <p:cTn id="173" fill="hold">
                       <p:stCondLst>
                         <p:cond delay="indefinite"/>
                       </p:stCondLst>
                       <p:childTnLst>
                         <p:par>
-                          <p:cTn id="146" fill="hold">
+                          <p:cTn id="174" fill="hold">
                             <p:stCondLst>
                               <p:cond delay="0"/>
                             </p:stCondLst>
                             <p:childTnLst>
                               <p:par>
-                                <p:cTn id="147" presetClass="exit" nodeType="clickEffect" presetSubtype="2" presetID="2" grpId="35" fill="hold">
+                                <p:cTn id="175" presetClass="exit" nodeType="clickEffect" presetSubtype="2" presetID="2" grpId="42" fill="hold">
                                   <p:stCondLst>
                                     <p:cond delay="0"/>
                                   </p:stCondLst>
@@ -5857,7 +6510,7 @@
                                   <p:childTnLst>
                                     <p:anim calcmode="lin" valueType="num">
                                       <p:cBhvr>
-                                        <p:cTn id="148" dur="1000" fill="hold"/>
+                                        <p:cTn id="176" dur="1000" fill="hold"/>
                                         <p:tgtEl>
                                           <p:spTgt spid="313"/>
                                         </p:tgtEl>
@@ -5880,7 +6533,7 @@
                                     </p:anim>
                                     <p:anim calcmode="lin" valueType="num">
                                       <p:cBhvr>
-                                        <p:cTn id="149" dur="1000" fill="hold"/>
+                                        <p:cTn id="177" dur="1000" fill="hold"/>
                                         <p:tgtEl>
                                           <p:spTgt spid="313"/>
                                         </p:tgtEl>
@@ -5903,7 +6556,7 @@
                                     </p:anim>
                                     <p:set>
                                       <p:cBhvr>
-                                        <p:cTn id="150" fill="hold">
+                                        <p:cTn id="178" fill="hold">
                                           <p:stCondLst>
                                             <p:cond delay="999"/>
                                           </p:stCondLst>
@@ -5929,19 +6582,19 @@
                     </p:cTn>
                   </p:par>
                   <p:par>
-                    <p:cTn id="151" fill="hold">
+                    <p:cTn id="179" fill="hold">
                       <p:stCondLst>
                         <p:cond delay="indefinite"/>
                       </p:stCondLst>
                       <p:childTnLst>
                         <p:par>
-                          <p:cTn id="152" fill="hold">
+                          <p:cTn id="180" fill="hold">
                             <p:stCondLst>
                               <p:cond delay="0"/>
                             </p:stCondLst>
                             <p:childTnLst>
                               <p:par>
-                                <p:cTn id="153" presetClass="exit" nodeType="clickEffect" presetSubtype="2" presetID="2" grpId="36" fill="hold">
+                                <p:cTn id="181" presetClass="exit" nodeType="clickEffect" presetSubtype="2" presetID="2" grpId="43" fill="hold">
                                   <p:stCondLst>
                                     <p:cond delay="0"/>
                                   </p:stCondLst>
@@ -5951,7 +6604,7 @@
                                   <p:childTnLst>
                                     <p:anim calcmode="lin" valueType="num">
                                       <p:cBhvr>
-                                        <p:cTn id="154" dur="1000" fill="hold"/>
+                                        <p:cTn id="182" dur="1000" fill="hold"/>
                                         <p:tgtEl>
                                           <p:spTgt spid="310"/>
                                         </p:tgtEl>
@@ -5974,7 +6627,7 @@
                                     </p:anim>
                                     <p:anim calcmode="lin" valueType="num">
                                       <p:cBhvr>
-                                        <p:cTn id="155" dur="1000" fill="hold"/>
+                                        <p:cTn id="183" dur="1000" fill="hold"/>
                                         <p:tgtEl>
                                           <p:spTgt spid="310"/>
                                         </p:tgtEl>
@@ -5997,7 +6650,7 @@
                                     </p:anim>
                                     <p:set>
                                       <p:cBhvr>
-                                        <p:cTn id="156" fill="hold">
+                                        <p:cTn id="184" fill="hold">
                                           <p:stCondLst>
                                             <p:cond delay="999"/>
                                           </p:stCondLst>
@@ -6044,42 +6697,49 @@
       </p:par>
     </p:tnLst>
     <p:bldLst>
-      <p:bldP build="whole" bldLvl="1" animBg="1" rev="0" advAuto="0" spid="313" grpId="21"/>
-      <p:bldP build="whole" bldLvl="1" animBg="1" rev="0" advAuto="0" spid="311" grpId="5"/>
-      <p:bldP build="whole" bldLvl="1" animBg="1" rev="0" advAuto="0" spid="328" grpId="6"/>
-      <p:bldP build="whole" bldLvl="1" animBg="1" rev="0" advAuto="0" spid="315" grpId="10"/>
-      <p:bldP build="whole" bldLvl="1" animBg="1" rev="0" advAuto="0" spid="335" grpId="25"/>
-      <p:bldP build="whole" bldLvl="1" animBg="1" rev="0" advAuto="0" spid="331" grpId="12"/>
-      <p:bldP build="whole" bldLvl="1" animBg="1" rev="0" advAuto="0" spid="313" grpId="27"/>
-      <p:bldP build="whole" bldLvl="1" animBg="1" rev="0" advAuto="0" spid="311" grpId="11"/>
-      <p:bldP build="whole" bldLvl="1" animBg="1" rev="0" advAuto="0" spid="310" grpId="29"/>
-      <p:bldP build="whole" bldLvl="1" animBg="1" rev="0" advAuto="0" spid="310" grpId="36"/>
-      <p:bldP build="whole" bldLvl="1" animBg="1" rev="0" advAuto="0" spid="315" grpId="17"/>
-      <p:bldP build="whole" bldLvl="1" animBg="1" rev="0" advAuto="0" spid="316" grpId="8"/>
-      <p:bldP build="whole" bldLvl="1" animBg="1" rev="0" advAuto="0" spid="332" grpId="13"/>
-      <p:bldP build="whole" bldLvl="1" animBg="1" rev="0" advAuto="0" spid="311" grpId="18"/>
-      <p:bldP build="whole" bldLvl="1" animBg="1" rev="0" advAuto="0" spid="313" grpId="35"/>
-      <p:bldP build="whole" bldLvl="1" animBg="1" rev="0" advAuto="0" spid="337" grpId="30"/>
-      <p:bldP build="whole" bldLvl="1" animBg="1" rev="0" advAuto="0" spid="336" grpId="26"/>
-      <p:bldP build="whole" bldLvl="1" animBg="1" rev="0" advAuto="0" spid="311" grpId="24"/>
-      <p:bldP build="whole" bldLvl="1" animBg="1" rev="0" advAuto="0" spid="312" grpId="9"/>
-      <p:bldP build="whole" bldLvl="1" animBg="1" rev="0" advAuto="0" spid="333" grpId="19"/>
-      <p:bldP build="whole" bldLvl="1" animBg="1" rev="0" advAuto="0" spid="330" grpId="2"/>
-      <p:bldP build="whole" bldLvl="1" animBg="1" rev="0" advAuto="0" spid="309" grpId="15"/>
-      <p:bldP build="whole" bldLvl="1" animBg="1" rev="0" advAuto="0" spid="334" grpId="20"/>
-      <p:bldP build="whole" bldLvl="1" animBg="1" rev="0" advAuto="0" spid="315" grpId="33"/>
-      <p:bldP build="whole" bldLvl="1" animBg="1" rev="0" advAuto="0" spid="311" grpId="34"/>
-      <p:bldP build="whole" bldLvl="1" animBg="1" rev="0" advAuto="0" spid="312" grpId="16"/>
+      <p:bldP build="whole" bldLvl="1" animBg="1" rev="0" advAuto="0" spid="314" grpId="34"/>
+      <p:bldP build="whole" bldLvl="1" animBg="1" rev="0" advAuto="0" spid="328" grpId="8"/>
+      <p:bldP build="whole" bldLvl="1" animBg="1" rev="0" advAuto="0" spid="334" grpId="24"/>
+      <p:bldP build="whole" bldLvl="1" animBg="1" rev="0" advAuto="0" spid="343" grpId="25"/>
+      <p:bldP build="whole" bldLvl="1" animBg="1" rev="0" advAuto="0" spid="332" grpId="16"/>
+      <p:bldP build="whole" bldLvl="1" animBg="1" rev="0" advAuto="0" spid="312" grpId="12"/>
+      <p:bldP build="whole" bldLvl="1" animBg="1" rev="0" advAuto="0" spid="310" grpId="35"/>
+      <p:bldP build="whole" bldLvl="1" animBg="1" rev="0" advAuto="0" spid="313" grpId="18"/>
+      <p:bldP build="whole" bldLvl="1" animBg="1" rev="0" advAuto="0" spid="315" grpId="40"/>
+      <p:bldP build="whole" bldLvl="1" animBg="1" rev="0" advAuto="0" spid="308" grpId="4"/>
+      <p:bldP build="whole" bldLvl="1" animBg="1" rev="0" advAuto="0" spid="329" grpId="9"/>
+      <p:bldP build="whole" bldLvl="1" animBg="1" rev="0" advAuto="0" spid="345" grpId="38"/>
+      <p:bldP build="whole" bldLvl="1" animBg="1" rev="0" advAuto="0" spid="311" grpId="6"/>
+      <p:bldP build="whole" bldLvl="1" animBg="1" rev="0" advAuto="0" spid="312" grpId="20"/>
+      <p:bldP build="whole" bldLvl="1" animBg="1" rev="0" advAuto="0" spid="313" grpId="26"/>
+      <p:bldP build="whole" bldLvl="1" animBg="1" rev="0" advAuto="0" spid="310" grpId="43"/>
+      <p:bldP build="whole" bldLvl="1" animBg="1" rev="0" advAuto="0" spid="341" grpId="10"/>
+      <p:bldP build="whole" bldLvl="1" animBg="1" rev="0" advAuto="0" spid="311" grpId="14"/>
+      <p:bldP build="whole" bldLvl="1" animBg="1" rev="0" advAuto="0" spid="309" grpId="19"/>
       <p:bldP build="whole" bldLvl="1" animBg="1" rev="0" advAuto="0" spid="302" grpId="1"/>
-      <p:bldP build="whole" bldLvl="1" animBg="1" rev="0" advAuto="0" spid="312" grpId="32"/>
-      <p:bldP build="whole" bldLvl="1" animBg="1" rev="0" advAuto="0" spid="329" grpId="7"/>
-      <p:bldP build="whole" bldLvl="1" animBg="1" rev="0" advAuto="0" spid="338" grpId="31"/>
-      <p:bldP build="whole" bldLvl="1" animBg="1" rev="0" advAuto="0" spid="317" grpId="23"/>
-      <p:bldP build="whole" bldLvl="1" animBg="1" rev="0" advAuto="0" spid="314" grpId="22"/>
-      <p:bldP build="whole" bldLvl="1" animBg="1" rev="0" advAuto="0" spid="314" grpId="28"/>
-      <p:bldP build="whole" bldLvl="1" animBg="1" rev="0" advAuto="0" spid="308" grpId="3"/>
-      <p:bldP build="whole" bldLvl="1" animBg="1" rev="0" advAuto="0" spid="313" grpId="14"/>
-      <p:bldP build="whole" bldLvl="1" animBg="1" rev="0" advAuto="0" spid="315" grpId="4"/>
+      <p:bldP build="whole" bldLvl="1" animBg="1" rev="0" advAuto="0" spid="333" grpId="23"/>
+      <p:bldP build="whole" bldLvl="1" animBg="1" rev="0" advAuto="0" spid="330" grpId="3"/>
+      <p:bldP build="whole" bldLvl="1" animBg="1" rev="0" advAuto="0" spid="313" grpId="33"/>
+      <p:bldP build="whole" bldLvl="1" animBg="1" rev="0" advAuto="0" spid="337" grpId="36"/>
+      <p:bldP build="whole" bldLvl="1" animBg="1" rev="0" advAuto="0" spid="311" grpId="22"/>
+      <p:bldP build="whole" bldLvl="1" animBg="1" rev="0" advAuto="0" spid="313" grpId="42"/>
+      <p:bldP build="whole" bldLvl="1" animBg="1" rev="0" advAuto="0" spid="312" grpId="39"/>
+      <p:bldP build="whole" bldLvl="1" animBg="1" rev="0" advAuto="0" spid="331" grpId="15"/>
+      <p:bldP build="whole" bldLvl="1" animBg="1" rev="0" advAuto="0" spid="311" grpId="29"/>
+      <p:bldP build="whole" bldLvl="1" animBg="1" rev="0" advAuto="0" spid="335" grpId="30"/>
+      <p:bldP build="whole" bldLvl="1" animBg="1" rev="0" advAuto="0" spid="344" grpId="32"/>
+      <p:bldP build="whole" bldLvl="1" animBg="1" rev="0" advAuto="0" spid="342" grpId="17"/>
+      <p:bldP build="whole" bldLvl="1" animBg="1" rev="0" advAuto="0" spid="316" grpId="11"/>
+      <p:bldP build="whole" bldLvl="1" animBg="1" rev="0" advAuto="0" spid="315" grpId="5"/>
+      <p:bldP build="whole" bldLvl="1" animBg="1" rev="0" advAuto="0" spid="336" grpId="31"/>
+      <p:bldP build="whole" bldLvl="1" animBg="1" rev="0" advAuto="0" spid="338" grpId="37"/>
+      <p:bldP build="whole" bldLvl="1" animBg="1" rev="0" advAuto="0" spid="311" grpId="41"/>
+      <p:bldP build="whole" bldLvl="1" animBg="1" rev="0" advAuto="0" spid="339" grpId="2"/>
+      <p:bldP build="whole" bldLvl="1" animBg="1" rev="0" advAuto="0" spid="315" grpId="13"/>
+      <p:bldP build="whole" bldLvl="1" animBg="1" rev="0" advAuto="0" spid="317" grpId="28"/>
+      <p:bldP build="whole" bldLvl="1" animBg="1" rev="0" advAuto="0" spid="314" grpId="27"/>
+      <p:bldP build="whole" bldLvl="1" animBg="1" rev="0" advAuto="0" spid="315" grpId="21"/>
+      <p:bldP build="whole" bldLvl="1" animBg="1" rev="0" advAuto="0" spid="340" grpId="7"/>
     </p:bldLst>
   </p:timing>
 </p:sld>
@@ -6104,7 +6764,7 @@
       </p:grpSpPr>
       <p:sp>
         <p:nvSpPr>
-          <p:cNvPr id="340" name="Prim’s Algo: Proof by Induction"/>
+          <p:cNvPr id="347" name="Prim’s Algo: Proof by Induction"/>
           <p:cNvSpPr txBox="1"/>
           <p:nvPr>
             <p:ph type="title"/>
@@ -6128,7 +6788,7 @@
       </p:sp>
       <p:sp>
         <p:nvSpPr>
-          <p:cNvPr id="341" name="Claim: Let G = (V,E) be a weighted graph and (X,Y) be a partition of  V (called a cut).…"/>
+          <p:cNvPr id="348" name="Claim: Let G = (V,E) be a weighted graph and (X,Y) be a partition of  V (called a cut).…"/>
           <p:cNvSpPr txBox="1"/>
           <p:nvPr>
             <p:ph type="body" idx="1"/>
@@ -6339,7 +6999,7 @@
       </p:sp>
       <p:sp>
         <p:nvSpPr>
-          <p:cNvPr id="342" name="Slide Number"/>
+          <p:cNvPr id="349" name="Slide Number"/>
           <p:cNvSpPr txBox="1"/>
           <p:nvPr>
             <p:ph type="sldNum" sz="quarter" idx="2"/>
@@ -6366,7 +7026,7 @@
       </p:sp>
       <p:sp>
         <p:nvSpPr>
-          <p:cNvPr id="343" name="DAA/Greedy Algorithms"/>
+          <p:cNvPr id="350" name="DAA/Greedy Algorithms"/>
           <p:cNvSpPr txBox="1"/>
           <p:nvPr/>
         </p:nvSpPr>
@@ -6406,7 +7066,7 @@
       </p:sp>
       <p:sp>
         <p:nvSpPr>
-          <p:cNvPr id="344" name="RPR/"/>
+          <p:cNvPr id="351" name="RPR/"/>
           <p:cNvSpPr txBox="1"/>
           <p:nvPr/>
         </p:nvSpPr>
@@ -6446,7 +7106,7 @@
       </p:sp>
       <p:grpSp>
         <p:nvGrpSpPr>
-          <p:cNvPr id="373" name="Group"/>
+          <p:cNvPr id="380" name="Group"/>
           <p:cNvGrpSpPr/>
           <p:nvPr/>
         </p:nvGrpSpPr>
@@ -6460,7 +7120,7 @@
         </p:grpSpPr>
         <p:sp>
           <p:nvSpPr>
-            <p:cNvPr id="345" name="Circle"/>
+            <p:cNvPr id="352" name="Circle"/>
             <p:cNvSpPr/>
             <p:nvPr/>
           </p:nvSpPr>
@@ -6503,7 +7163,7 @@
         </p:sp>
         <p:sp>
           <p:nvSpPr>
-            <p:cNvPr id="346" name="Circle"/>
+            <p:cNvPr id="353" name="Circle"/>
             <p:cNvSpPr/>
             <p:nvPr/>
           </p:nvSpPr>
@@ -6546,7 +7206,7 @@
         </p:sp>
         <p:sp>
           <p:nvSpPr>
-            <p:cNvPr id="347" name="Circle"/>
+            <p:cNvPr id="354" name="Circle"/>
             <p:cNvSpPr/>
             <p:nvPr/>
           </p:nvSpPr>
@@ -6589,7 +7249,7 @@
         </p:sp>
         <p:sp>
           <p:nvSpPr>
-            <p:cNvPr id="348" name="Circle"/>
+            <p:cNvPr id="355" name="Circle"/>
             <p:cNvSpPr/>
             <p:nvPr/>
           </p:nvSpPr>
@@ -6632,7 +7292,7 @@
         </p:sp>
         <p:grpSp>
           <p:nvGrpSpPr>
-            <p:cNvPr id="351" name="Group"/>
+            <p:cNvPr id="358" name="Group"/>
             <p:cNvGrpSpPr/>
             <p:nvPr/>
           </p:nvGrpSpPr>
@@ -6646,7 +7306,7 @@
           </p:grpSpPr>
           <p:sp>
             <p:nvSpPr>
-              <p:cNvPr id="349" name="Circle"/>
+              <p:cNvPr id="356" name="Circle"/>
               <p:cNvSpPr/>
               <p:nvPr/>
             </p:nvSpPr>
@@ -6689,7 +7349,7 @@
           </p:sp>
           <p:sp>
             <p:nvSpPr>
-              <p:cNvPr id="350" name="y"/>
+              <p:cNvPr id="357" name="y"/>
               <p:cNvSpPr txBox="1"/>
               <p:nvPr/>
             </p:nvSpPr>
@@ -6738,7 +7398,7 @@
         </p:grpSp>
         <p:sp>
           <p:nvSpPr>
-            <p:cNvPr id="352" name="Circle"/>
+            <p:cNvPr id="359" name="Circle"/>
             <p:cNvSpPr/>
             <p:nvPr/>
           </p:nvSpPr>
@@ -6781,7 +7441,7 @@
         </p:sp>
         <p:grpSp>
           <p:nvGrpSpPr>
-            <p:cNvPr id="355" name="Group"/>
+            <p:cNvPr id="362" name="Group"/>
             <p:cNvGrpSpPr/>
             <p:nvPr/>
           </p:nvGrpSpPr>
@@ -6795,7 +7455,7 @@
           </p:grpSpPr>
           <p:sp>
             <p:nvSpPr>
-              <p:cNvPr id="353" name="Circle"/>
+              <p:cNvPr id="360" name="Circle"/>
               <p:cNvSpPr/>
               <p:nvPr/>
             </p:nvSpPr>
@@ -6838,7 +7498,7 @@
           </p:sp>
           <p:sp>
             <p:nvSpPr>
-              <p:cNvPr id="354" name="x"/>
+              <p:cNvPr id="361" name="x"/>
               <p:cNvSpPr txBox="1"/>
               <p:nvPr/>
             </p:nvSpPr>
@@ -6887,7 +7547,7 @@
         </p:grpSp>
         <p:sp>
           <p:nvSpPr>
-            <p:cNvPr id="356" name="Circle"/>
+            <p:cNvPr id="363" name="Circle"/>
             <p:cNvSpPr/>
             <p:nvPr/>
           </p:nvSpPr>
@@ -6930,7 +7590,7 @@
         </p:sp>
         <p:sp>
           <p:nvSpPr>
-            <p:cNvPr id="357" name="Circle"/>
+            <p:cNvPr id="364" name="Circle"/>
             <p:cNvSpPr/>
             <p:nvPr/>
           </p:nvSpPr>
@@ -6973,7 +7633,7 @@
         </p:sp>
         <p:sp>
           <p:nvSpPr>
-            <p:cNvPr id="358" name="Circle"/>
+            <p:cNvPr id="365" name="Circle"/>
             <p:cNvSpPr/>
             <p:nvPr/>
           </p:nvSpPr>
@@ -7016,7 +7676,7 @@
         </p:sp>
         <p:sp>
           <p:nvSpPr>
-            <p:cNvPr id="359" name="Line"/>
+            <p:cNvPr id="366" name="Line"/>
             <p:cNvSpPr/>
             <p:nvPr/>
           </p:nvSpPr>
@@ -7117,10 +7777,10 @@
         </p:sp>
         <p:cxnSp>
           <p:nvCxnSpPr>
-            <p:cNvPr id="360" name="Connection Line"/>
+            <p:cNvPr id="367" name="Connection Line"/>
             <p:cNvCxnSpPr>
-              <a:stCxn id="356" idx="0"/>
-              <a:endCxn id="345" idx="0"/>
+              <a:stCxn id="363" idx="0"/>
+              <a:endCxn id="352" idx="0"/>
             </p:cNvCxnSpPr>
             <p:nvPr/>
           </p:nvCxnSpPr>
@@ -7144,7 +7804,7 @@
         </p:cxnSp>
         <p:sp>
           <p:nvSpPr>
-            <p:cNvPr id="375" name="Connection Line"/>
+            <p:cNvPr id="382" name="Connection Line"/>
             <p:cNvSpPr/>
             <p:nvPr/>
           </p:nvSpPr>
@@ -7203,7 +7863,7 @@
         </p:sp>
         <p:sp>
           <p:nvSpPr>
-            <p:cNvPr id="376" name="Connection Line"/>
+            <p:cNvPr id="383" name="Connection Line"/>
             <p:cNvSpPr/>
             <p:nvPr/>
           </p:nvSpPr>
@@ -7262,7 +7922,7 @@
         </p:sp>
         <p:sp>
           <p:nvSpPr>
-            <p:cNvPr id="377" name="Connection Line"/>
+            <p:cNvPr id="384" name="Connection Line"/>
             <p:cNvSpPr/>
             <p:nvPr/>
           </p:nvSpPr>
@@ -7321,7 +7981,7 @@
         </p:sp>
         <p:sp>
           <p:nvSpPr>
-            <p:cNvPr id="378" name="Connection Line"/>
+            <p:cNvPr id="385" name="Connection Line"/>
             <p:cNvSpPr/>
             <p:nvPr/>
           </p:nvSpPr>
@@ -7380,10 +8040,10 @@
         </p:sp>
         <p:cxnSp>
           <p:nvCxnSpPr>
-            <p:cNvPr id="365" name="Connection Line"/>
+            <p:cNvPr id="372" name="Connection Line"/>
             <p:cNvCxnSpPr>
-              <a:stCxn id="358" idx="0"/>
-              <a:endCxn id="346" idx="0"/>
+              <a:stCxn id="365" idx="0"/>
+              <a:endCxn id="353" idx="0"/>
             </p:cNvCxnSpPr>
             <p:nvPr/>
           </p:nvCxnSpPr>
@@ -7407,10 +8067,10 @@
         </p:cxnSp>
         <p:cxnSp>
           <p:nvCxnSpPr>
-            <p:cNvPr id="366" name="Connection Line"/>
+            <p:cNvPr id="373" name="Connection Line"/>
             <p:cNvCxnSpPr>
-              <a:stCxn id="348" idx="0"/>
-              <a:endCxn id="356" idx="0"/>
+              <a:stCxn id="355" idx="0"/>
+              <a:endCxn id="363" idx="0"/>
             </p:cNvCxnSpPr>
             <p:nvPr/>
           </p:nvCxnSpPr>
@@ -7434,10 +8094,10 @@
         </p:cxnSp>
         <p:cxnSp>
           <p:nvCxnSpPr>
-            <p:cNvPr id="367" name="Connection Line"/>
+            <p:cNvPr id="374" name="Connection Line"/>
             <p:cNvCxnSpPr>
-              <a:stCxn id="345" idx="0"/>
-              <a:endCxn id="347" idx="0"/>
+              <a:stCxn id="352" idx="0"/>
+              <a:endCxn id="354" idx="0"/>
             </p:cNvCxnSpPr>
             <p:nvPr/>
           </p:nvCxnSpPr>
@@ -7461,10 +8121,10 @@
         </p:cxnSp>
         <p:cxnSp>
           <p:nvCxnSpPr>
-            <p:cNvPr id="368" name="Connection Line"/>
+            <p:cNvPr id="375" name="Connection Line"/>
             <p:cNvCxnSpPr>
-              <a:stCxn id="345" idx="0"/>
-              <a:endCxn id="352" idx="0"/>
+              <a:stCxn id="352" idx="0"/>
+              <a:endCxn id="359" idx="0"/>
             </p:cNvCxnSpPr>
             <p:nvPr/>
           </p:nvCxnSpPr>
@@ -7488,7 +8148,7 @@
         </p:cxnSp>
         <p:sp>
           <p:nvSpPr>
-            <p:cNvPr id="379" name="Connection Line"/>
+            <p:cNvPr id="386" name="Connection Line"/>
             <p:cNvSpPr/>
             <p:nvPr/>
           </p:nvSpPr>
@@ -7547,7 +8207,7 @@
         </p:sp>
         <p:sp>
           <p:nvSpPr>
-            <p:cNvPr id="380" name="Connection Line"/>
+            <p:cNvPr id="387" name="Connection Line"/>
             <p:cNvSpPr/>
             <p:nvPr/>
           </p:nvSpPr>
@@ -7606,7 +8266,7 @@
         </p:sp>
         <p:sp>
           <p:nvSpPr>
-            <p:cNvPr id="371" name="X"/>
+            <p:cNvPr id="378" name="X"/>
             <p:cNvSpPr txBox="1"/>
             <p:nvPr/>
           </p:nvSpPr>
@@ -7657,7 +8317,7 @@
         </p:sp>
         <p:sp>
           <p:nvSpPr>
-            <p:cNvPr id="372" name="Y"/>
+            <p:cNvPr id="379" name="Y"/>
             <p:cNvSpPr txBox="1"/>
             <p:nvPr/>
           </p:nvSpPr>
@@ -7709,7 +8369,7 @@
       </p:grpSp>
       <p:sp>
         <p:nvSpPr>
-          <p:cNvPr id="374" name="e"/>
+          <p:cNvPr id="381" name="e"/>
           <p:cNvSpPr txBox="1"/>
           <p:nvPr/>
         </p:nvSpPr>
@@ -7791,7 +8451,7 @@
                                       <p:cBhvr>
                                         <p:cTn id="6" fill="hold"/>
                                         <p:tgtEl>
-                                          <p:spTgt spid="341">
+                                          <p:spTgt spid="348">
                                             <p:bg/>
                                           </p:spTgt>
                                         </p:tgtEl>
@@ -7819,7 +8479,7 @@
                                       <p:cBhvr>
                                         <p:cTn id="8" fill="hold"/>
                                         <p:tgtEl>
-                                          <p:spTgt spid="341">
+                                          <p:spTgt spid="348">
                                             <p:txEl>
                                               <p:pRg st="0" end="0"/>
                                             </p:txEl>
@@ -7867,7 +8527,7 @@
                                       <p:cBhvr>
                                         <p:cTn id="12" fill="hold"/>
                                         <p:tgtEl>
-                                          <p:spTgt spid="373"/>
+                                          <p:spTgt spid="380"/>
                                         </p:tgtEl>
                                         <p:attrNameLst>
                                           <p:attrName>style.visibility</p:attrName>
@@ -7911,7 +8571,7 @@
                                       <p:cBhvr>
                                         <p:cTn id="16" fill="hold"/>
                                         <p:tgtEl>
-                                          <p:spTgt spid="341">
+                                          <p:spTgt spid="348">
                                             <p:txEl>
                                               <p:pRg st="1" end="1"/>
                                             </p:txEl>
@@ -7959,7 +8619,7 @@
                                       <p:cBhvr>
                                         <p:cTn id="20" fill="hold"/>
                                         <p:tgtEl>
-                                          <p:spTgt spid="341">
+                                          <p:spTgt spid="348">
                                             <p:txEl>
                                               <p:pRg st="2" end="2"/>
                                             </p:txEl>
@@ -8007,7 +8667,7 @@
                                       <p:cBhvr>
                                         <p:cTn id="24" fill="hold"/>
                                         <p:tgtEl>
-                                          <p:spTgt spid="341">
+                                          <p:spTgt spid="348">
                                             <p:txEl>
                                               <p:pRg st="3" end="3"/>
                                             </p:txEl>
@@ -8055,7 +8715,7 @@
                                       <p:cBhvr>
                                         <p:cTn id="28" fill="hold"/>
                                         <p:tgtEl>
-                                          <p:spTgt spid="341">
+                                          <p:spTgt spid="348">
                                             <p:txEl>
                                               <p:pRg st="4" end="4"/>
                                             </p:txEl>
@@ -8103,7 +8763,7 @@
                                       <p:cBhvr>
                                         <p:cTn id="32" fill="hold"/>
                                         <p:tgtEl>
-                                          <p:spTgt spid="341">
+                                          <p:spTgt spid="348">
                                             <p:txEl>
                                               <p:pRg st="5" end="5"/>
                                             </p:txEl>
@@ -8151,7 +8811,7 @@
                                       <p:cBhvr>
                                         <p:cTn id="36" fill="hold"/>
                                         <p:tgtEl>
-                                          <p:spTgt spid="374"/>
+                                          <p:spTgt spid="381"/>
                                         </p:tgtEl>
                                         <p:attrNameLst>
                                           <p:attrName>style.visibility</p:attrName>
@@ -8192,9 +8852,9 @@
       </p:par>
     </p:tnLst>
     <p:bldLst>
-      <p:bldP build="p" bldLvl="5" animBg="1" rev="0" advAuto="0" spid="341" grpId="1"/>
-      <p:bldP build="whole" bldLvl="1" animBg="1" rev="0" advAuto="0" spid="373" grpId="2"/>
-      <p:bldP build="whole" bldLvl="1" animBg="1" rev="0" advAuto="0" spid="374" grpId="3"/>
+      <p:bldP build="whole" bldLvl="1" animBg="1" rev="0" advAuto="0" spid="381" grpId="3"/>
+      <p:bldP build="whole" bldLvl="1" animBg="1" rev="0" advAuto="0" spid="380" grpId="2"/>
+      <p:bldP build="p" bldLvl="5" animBg="1" rev="0" advAuto="0" spid="348" grpId="1"/>
     </p:bldLst>
   </p:timing>
 </p:sld>
@@ -8219,7 +8879,7 @@
       </p:grpSpPr>
       <p:sp>
         <p:nvSpPr>
-          <p:cNvPr id="382" name="Prim’s Algo"/>
+          <p:cNvPr id="389" name="Prim’s Algo"/>
           <p:cNvSpPr txBox="1"/>
           <p:nvPr>
             <p:ph type="title"/>
@@ -8243,7 +8903,7 @@
       </p:sp>
       <p:sp>
         <p:nvSpPr>
-          <p:cNvPr id="383" name="Needs priority queue for implementation…"/>
+          <p:cNvPr id="390" name="Needs priority queue for implementation…"/>
           <p:cNvSpPr txBox="1"/>
           <p:nvPr>
             <p:ph type="body" idx="1"/>
@@ -8867,7 +9527,7 @@
       </p:sp>
       <p:sp>
         <p:nvSpPr>
-          <p:cNvPr id="384" name="Slide Number"/>
+          <p:cNvPr id="391" name="Slide Number"/>
           <p:cNvSpPr txBox="1"/>
           <p:nvPr>
             <p:ph type="sldNum" sz="quarter" idx="2"/>
@@ -8894,7 +9554,7 @@
       </p:sp>
       <p:sp>
         <p:nvSpPr>
-          <p:cNvPr id="385" name="DAA/Greedy Algorithms"/>
+          <p:cNvPr id="392" name="DAA/Greedy Algorithms"/>
           <p:cNvSpPr txBox="1"/>
           <p:nvPr/>
         </p:nvSpPr>
@@ -8934,7 +9594,7 @@
       </p:sp>
       <p:sp>
         <p:nvSpPr>
-          <p:cNvPr id="386" name="RPR/"/>
+          <p:cNvPr id="393" name="RPR/"/>
           <p:cNvSpPr txBox="1"/>
           <p:nvPr/>
         </p:nvSpPr>
@@ -9011,7 +9671,7 @@
                                       <p:cBhvr>
                                         <p:cTn id="6" fill="hold"/>
                                         <p:tgtEl>
-                                          <p:spTgt spid="383">
+                                          <p:spTgt spid="390">
                                             <p:bg/>
                                           </p:spTgt>
                                         </p:tgtEl>
@@ -9039,7 +9699,7 @@
                                       <p:cBhvr>
                                         <p:cTn id="8" fill="hold"/>
                                         <p:tgtEl>
-                                          <p:spTgt spid="383">
+                                          <p:spTgt spid="390">
                                             <p:txEl>
                                               <p:pRg st="0" end="0"/>
                                             </p:txEl>
@@ -9087,7 +9747,7 @@
                                       <p:cBhvr>
                                         <p:cTn id="12" fill="hold"/>
                                         <p:tgtEl>
-                                          <p:spTgt spid="383">
+                                          <p:spTgt spid="390">
                                             <p:txEl>
                                               <p:pRg st="1" end="1"/>
                                             </p:txEl>
@@ -9135,7 +9795,7 @@
                                       <p:cBhvr>
                                         <p:cTn id="16" fill="hold"/>
                                         <p:tgtEl>
-                                          <p:spTgt spid="383">
+                                          <p:spTgt spid="390">
                                             <p:txEl>
                                               <p:pRg st="2" end="2"/>
                                             </p:txEl>
@@ -9183,7 +9843,7 @@
                                       <p:cBhvr>
                                         <p:cTn id="20" fill="hold"/>
                                         <p:tgtEl>
-                                          <p:spTgt spid="383">
+                                          <p:spTgt spid="390">
                                             <p:txEl>
                                               <p:pRg st="3" end="3"/>
                                             </p:txEl>
@@ -9231,7 +9891,7 @@
                                       <p:cBhvr>
                                         <p:cTn id="24" fill="hold"/>
                                         <p:tgtEl>
-                                          <p:spTgt spid="383">
+                                          <p:spTgt spid="390">
                                             <p:txEl>
                                               <p:pRg st="4" end="4"/>
                                             </p:txEl>
@@ -9279,7 +9939,7 @@
                                       <p:cBhvr>
                                         <p:cTn id="28" fill="hold"/>
                                         <p:tgtEl>
-                                          <p:spTgt spid="383">
+                                          <p:spTgt spid="390">
                                             <p:txEl>
                                               <p:pRg st="5" end="5"/>
                                             </p:txEl>
@@ -9327,7 +9987,7 @@
                                       <p:cBhvr>
                                         <p:cTn id="32" fill="hold"/>
                                         <p:tgtEl>
-                                          <p:spTgt spid="383">
+                                          <p:spTgt spid="390">
                                             <p:txEl>
                                               <p:pRg st="6" end="6"/>
                                             </p:txEl>
@@ -9375,7 +10035,7 @@
                                       <p:cBhvr>
                                         <p:cTn id="36" fill="hold"/>
                                         <p:tgtEl>
-                                          <p:spTgt spid="383">
+                                          <p:spTgt spid="390">
                                             <p:txEl>
                                               <p:pRg st="7" end="7"/>
                                             </p:txEl>
@@ -9423,7 +10083,7 @@
                                       <p:cBhvr>
                                         <p:cTn id="40" fill="hold"/>
                                         <p:tgtEl>
-                                          <p:spTgt spid="383">
+                                          <p:spTgt spid="390">
                                             <p:txEl>
                                               <p:pRg st="8" end="8"/>
                                             </p:txEl>
@@ -9471,7 +10131,7 @@
                                       <p:cBhvr>
                                         <p:cTn id="44" fill="hold"/>
                                         <p:tgtEl>
-                                          <p:spTgt spid="383">
+                                          <p:spTgt spid="390">
                                             <p:txEl>
                                               <p:pRg st="9" end="9"/>
                                             </p:txEl>
@@ -9519,7 +10179,7 @@
                                       <p:cBhvr>
                                         <p:cTn id="48" fill="hold"/>
                                         <p:tgtEl>
-                                          <p:spTgt spid="383">
+                                          <p:spTgt spid="390">
                                             <p:txEl>
                                               <p:pRg st="10" end="10"/>
                                             </p:txEl>
@@ -9564,7 +10224,7 @@
       </p:par>
     </p:tnLst>
     <p:bldLst>
-      <p:bldP build="p" bldLvl="5" animBg="1" rev="0" advAuto="0" spid="383" grpId="1"/>
+      <p:bldP build="p" bldLvl="5" animBg="1" rev="0" advAuto="0" spid="390" grpId="1"/>
     </p:bldLst>
   </p:timing>
 </p:sld>
@@ -9589,7 +10249,7 @@
       </p:grpSpPr>
       <p:sp>
         <p:nvSpPr>
-          <p:cNvPr id="388" name="Prim’s Algo: Efficiency"/>
+          <p:cNvPr id="395" name="Prim’s Algo: Efficiency"/>
           <p:cNvSpPr txBox="1"/>
           <p:nvPr>
             <p:ph type="title"/>
@@ -9613,7 +10273,7 @@
       </p:sp>
       <p:sp>
         <p:nvSpPr>
-          <p:cNvPr id="389" name="Efficiency depends upon implementation…"/>
+          <p:cNvPr id="396" name="Efficiency depends upon implementation…"/>
           <p:cNvSpPr txBox="1"/>
           <p:nvPr>
             <p:ph type="body" idx="1"/>
@@ -9873,7 +10533,7 @@
       </p:sp>
       <p:sp>
         <p:nvSpPr>
-          <p:cNvPr id="390" name="Slide Number"/>
+          <p:cNvPr id="397" name="Slide Number"/>
           <p:cNvSpPr txBox="1"/>
           <p:nvPr>
             <p:ph type="sldNum" sz="quarter" idx="2"/>
@@ -9900,7 +10560,7 @@
       </p:sp>
       <p:sp>
         <p:nvSpPr>
-          <p:cNvPr id="391" name="DAA/Greedy Algorithms"/>
+          <p:cNvPr id="398" name="DAA/Greedy Algorithms"/>
           <p:cNvSpPr txBox="1"/>
           <p:nvPr/>
         </p:nvSpPr>
@@ -9940,7 +10600,7 @@
       </p:sp>
       <p:sp>
         <p:nvSpPr>
-          <p:cNvPr id="392" name="RPR/"/>
+          <p:cNvPr id="399" name="RPR/"/>
           <p:cNvSpPr txBox="1"/>
           <p:nvPr/>
         </p:nvSpPr>
@@ -10017,7 +10677,7 @@
                                       <p:cBhvr>
                                         <p:cTn id="6" fill="hold"/>
                                         <p:tgtEl>
-                                          <p:spTgt spid="389">
+                                          <p:spTgt spid="396">
                                             <p:bg/>
                                           </p:spTgt>
                                         </p:tgtEl>
@@ -10045,7 +10705,7 @@
                                       <p:cBhvr>
                                         <p:cTn id="8" fill="hold"/>
                                         <p:tgtEl>
-                                          <p:spTgt spid="389">
+                                          <p:spTgt spid="396">
                                             <p:txEl>
                                               <p:pRg st="0" end="0"/>
                                             </p:txEl>
@@ -10093,7 +10753,7 @@
                                       <p:cBhvr>
                                         <p:cTn id="12" fill="hold"/>
                                         <p:tgtEl>
-                                          <p:spTgt spid="389">
+                                          <p:spTgt spid="396">
                                             <p:txEl>
                                               <p:pRg st="1" end="1"/>
                                             </p:txEl>
@@ -10141,7 +10801,7 @@
                                       <p:cBhvr>
                                         <p:cTn id="16" fill="hold"/>
                                         <p:tgtEl>
-                                          <p:spTgt spid="389">
+                                          <p:spTgt spid="396">
                                             <p:txEl>
                                               <p:pRg st="2" end="2"/>
                                             </p:txEl>
@@ -10189,7 +10849,7 @@
                                       <p:cBhvr>
                                         <p:cTn id="20" fill="hold"/>
                                         <p:tgtEl>
-                                          <p:spTgt spid="389">
+                                          <p:spTgt spid="396">
                                             <p:txEl>
                                               <p:pRg st="3" end="3"/>
                                             </p:txEl>
@@ -10237,7 +10897,7 @@
                                       <p:cBhvr>
                                         <p:cTn id="24" fill="hold"/>
                                         <p:tgtEl>
-                                          <p:spTgt spid="389">
+                                          <p:spTgt spid="396">
                                             <p:txEl>
                                               <p:pRg st="4" end="4"/>
                                             </p:txEl>
@@ -10285,7 +10945,7 @@
                                       <p:cBhvr>
                                         <p:cTn id="28" fill="hold"/>
                                         <p:tgtEl>
-                                          <p:spTgt spid="389">
+                                          <p:spTgt spid="396">
                                             <p:txEl>
                                               <p:pRg st="5" end="5"/>
                                             </p:txEl>
@@ -10333,7 +10993,7 @@
                                       <p:cBhvr>
                                         <p:cTn id="32" fill="hold"/>
                                         <p:tgtEl>
-                                          <p:spTgt spid="389">
+                                          <p:spTgt spid="396">
                                             <p:txEl>
                                               <p:pRg st="6" end="6"/>
                                             </p:txEl>
@@ -10381,7 +11041,7 @@
                                       <p:cBhvr>
                                         <p:cTn id="36" fill="hold"/>
                                         <p:tgtEl>
-                                          <p:spTgt spid="389">
+                                          <p:spTgt spid="396">
                                             <p:txEl>
                                               <p:pRg st="7" end="7"/>
                                             </p:txEl>
@@ -10429,7 +11089,7 @@
                                       <p:cBhvr>
                                         <p:cTn id="40" fill="hold"/>
                                         <p:tgtEl>
-                                          <p:spTgt spid="389">
+                                          <p:spTgt spid="396">
                                             <p:txEl>
                                               <p:pRg st="8" end="8"/>
                                             </p:txEl>
@@ -10477,7 +11137,7 @@
                                       <p:cBhvr>
                                         <p:cTn id="44" fill="hold"/>
                                         <p:tgtEl>
-                                          <p:spTgt spid="389">
+                                          <p:spTgt spid="396">
                                             <p:txEl>
                                               <p:pRg st="9" end="9"/>
                                             </p:txEl>
@@ -10525,7 +11185,7 @@
                                       <p:cBhvr>
                                         <p:cTn id="48" fill="hold"/>
                                         <p:tgtEl>
-                                          <p:spTgt spid="389">
+                                          <p:spTgt spid="396">
                                             <p:txEl>
                                               <p:pRg st="10" end="10"/>
                                             </p:txEl>
@@ -10573,7 +11233,7 @@
                                       <p:cBhvr>
                                         <p:cTn id="52" fill="hold"/>
                                         <p:tgtEl>
-                                          <p:spTgt spid="389">
+                                          <p:spTgt spid="396">
                                             <p:txEl>
                                               <p:pRg st="11" end="11"/>
                                             </p:txEl>
@@ -10618,7 +11278,7 @@
       </p:par>
     </p:tnLst>
     <p:bldLst>
-      <p:bldP build="p" bldLvl="5" animBg="1" rev="0" advAuto="0" spid="389" grpId="1"/>
+      <p:bldP build="p" bldLvl="5" animBg="1" rev="0" advAuto="0" spid="396" grpId="1"/>
     </p:bldLst>
   </p:timing>
 </p:sld>
@@ -10643,7 +11303,7 @@
       </p:grpSpPr>
       <p:sp>
         <p:nvSpPr>
-          <p:cNvPr id="394" name="Prim’s Algo: Efficiency"/>
+          <p:cNvPr id="401" name="Prim’s Algo: Efficiency"/>
           <p:cNvSpPr txBox="1"/>
           <p:nvPr>
             <p:ph type="title"/>
@@ -10667,7 +11327,7 @@
       </p:sp>
       <p:sp>
         <p:nvSpPr>
-          <p:cNvPr id="395" name="Efficiency depends upon implementation…"/>
+          <p:cNvPr id="402" name="Efficiency depends upon implementation…"/>
           <p:cNvSpPr txBox="1"/>
           <p:nvPr>
             <p:ph type="body" idx="1"/>
@@ -10991,7 +11651,7 @@
       </p:sp>
       <p:sp>
         <p:nvSpPr>
-          <p:cNvPr id="396" name="Slide Number"/>
+          <p:cNvPr id="403" name="Slide Number"/>
           <p:cNvSpPr txBox="1"/>
           <p:nvPr>
             <p:ph type="sldNum" sz="quarter" idx="2"/>
@@ -11018,7 +11678,7 @@
       </p:sp>
       <p:sp>
         <p:nvSpPr>
-          <p:cNvPr id="397" name="DAA/Greedy Algorithms"/>
+          <p:cNvPr id="404" name="DAA/Greedy Algorithms"/>
           <p:cNvSpPr txBox="1"/>
           <p:nvPr/>
         </p:nvSpPr>
@@ -11058,7 +11718,7 @@
       </p:sp>
       <p:sp>
         <p:nvSpPr>
-          <p:cNvPr id="398" name="RPR/"/>
+          <p:cNvPr id="405" name="RPR/"/>
           <p:cNvSpPr txBox="1"/>
           <p:nvPr/>
         </p:nvSpPr>
@@ -11135,7 +11795,7 @@
                                       <p:cBhvr>
                                         <p:cTn id="6" fill="hold"/>
                                         <p:tgtEl>
-                                          <p:spTgt spid="395">
+                                          <p:spTgt spid="402">
                                             <p:bg/>
                                           </p:spTgt>
                                         </p:tgtEl>
@@ -11163,7 +11823,7 @@
                                       <p:cBhvr>
                                         <p:cTn id="8" fill="hold"/>
                                         <p:tgtEl>
-                                          <p:spTgt spid="395">
+                                          <p:spTgt spid="402">
                                             <p:txEl>
                                               <p:pRg st="0" end="0"/>
                                             </p:txEl>
@@ -11211,7 +11871,7 @@
                                       <p:cBhvr>
                                         <p:cTn id="12" fill="hold"/>
                                         <p:tgtEl>
-                                          <p:spTgt spid="395">
+                                          <p:spTgt spid="402">
                                             <p:txEl>
                                               <p:pRg st="1" end="1"/>
                                             </p:txEl>
@@ -11259,7 +11919,7 @@
                                       <p:cBhvr>
                                         <p:cTn id="16" fill="hold"/>
                                         <p:tgtEl>
-                                          <p:spTgt spid="395">
+                                          <p:spTgt spid="402">
                                             <p:txEl>
                                               <p:pRg st="2" end="2"/>
                                             </p:txEl>
@@ -11307,7 +11967,7 @@
                                       <p:cBhvr>
                                         <p:cTn id="20" fill="hold"/>
                                         <p:tgtEl>
-                                          <p:spTgt spid="395">
+                                          <p:spTgt spid="402">
                                             <p:txEl>
                                               <p:pRg st="3" end="3"/>
                                             </p:txEl>
@@ -11355,7 +12015,7 @@
                                       <p:cBhvr>
                                         <p:cTn id="24" fill="hold"/>
                                         <p:tgtEl>
-                                          <p:spTgt spid="395">
+                                          <p:spTgt spid="402">
                                             <p:txEl>
                                               <p:pRg st="4" end="4"/>
                                             </p:txEl>
@@ -11403,7 +12063,7 @@
                                       <p:cBhvr>
                                         <p:cTn id="28" fill="hold"/>
                                         <p:tgtEl>
-                                          <p:spTgt spid="395">
+                                          <p:spTgt spid="402">
                                             <p:txEl>
                                               <p:pRg st="5" end="5"/>
                                             </p:txEl>
@@ -11451,7 +12111,7 @@
                                       <p:cBhvr>
                                         <p:cTn id="32" fill="hold"/>
                                         <p:tgtEl>
-                                          <p:spTgt spid="395">
+                                          <p:spTgt spid="402">
                                             <p:txEl>
                                               <p:pRg st="6" end="6"/>
                                             </p:txEl>
@@ -11499,7 +12159,7 @@
                                       <p:cBhvr>
                                         <p:cTn id="36" fill="hold"/>
                                         <p:tgtEl>
-                                          <p:spTgt spid="395">
+                                          <p:spTgt spid="402">
                                             <p:txEl>
                                               <p:pRg st="7" end="7"/>
                                             </p:txEl>
@@ -11547,7 +12207,7 @@
                                       <p:cBhvr>
                                         <p:cTn id="40" fill="hold"/>
                                         <p:tgtEl>
-                                          <p:spTgt spid="395">
+                                          <p:spTgt spid="402">
                                             <p:txEl>
                                               <p:pRg st="8" end="8"/>
                                             </p:txEl>
@@ -11595,7 +12255,7 @@
                                       <p:cBhvr>
                                         <p:cTn id="44" fill="hold"/>
                                         <p:tgtEl>
-                                          <p:spTgt spid="395">
+                                          <p:spTgt spid="402">
                                             <p:txEl>
                                               <p:pRg st="9" end="9"/>
                                             </p:txEl>
@@ -11643,7 +12303,7 @@
                                       <p:cBhvr>
                                         <p:cTn id="48" fill="hold"/>
                                         <p:tgtEl>
-                                          <p:spTgt spid="395">
+                                          <p:spTgt spid="402">
                                             <p:txEl>
                                               <p:pRg st="10" end="10"/>
                                             </p:txEl>
@@ -11691,7 +12351,7 @@
                                       <p:cBhvr>
                                         <p:cTn id="52" fill="hold"/>
                                         <p:tgtEl>
-                                          <p:spTgt spid="395">
+                                          <p:spTgt spid="402">
                                             <p:txEl>
                                               <p:pRg st="11" end="11"/>
                                             </p:txEl>
@@ -11736,7 +12396,7 @@
       </p:par>
     </p:tnLst>
     <p:bldLst>
-      <p:bldP build="p" bldLvl="5" animBg="1" rev="0" advAuto="0" spid="395" grpId="1"/>
+      <p:bldP build="p" bldLvl="5" animBg="1" rev="0" advAuto="0" spid="402" grpId="1"/>
     </p:bldLst>
   </p:timing>
 </p:sld>
@@ -11761,7 +12421,7 @@
       </p:grpSpPr>
       <p:sp>
         <p:nvSpPr>
-          <p:cNvPr id="400" name="Summary"/>
+          <p:cNvPr id="407" name="Summary"/>
           <p:cNvSpPr txBox="1"/>
           <p:nvPr>
             <p:ph type="title"/>
@@ -11785,7 +12445,7 @@
       </p:sp>
       <p:sp>
         <p:nvSpPr>
-          <p:cNvPr id="401" name="Minimum Spanning Tree…"/>
+          <p:cNvPr id="408" name="Minimum Spanning Tree…"/>
           <p:cNvSpPr txBox="1"/>
           <p:nvPr>
             <p:ph type="body" idx="1"/>
@@ -11827,7 +12487,7 @@
       </p:sp>
       <p:sp>
         <p:nvSpPr>
-          <p:cNvPr id="402" name="Slide Number"/>
+          <p:cNvPr id="409" name="Slide Number"/>
           <p:cNvSpPr txBox="1"/>
           <p:nvPr>
             <p:ph type="sldNum" sz="quarter" idx="2"/>
@@ -11854,7 +12514,7 @@
       </p:sp>
       <p:sp>
         <p:nvSpPr>
-          <p:cNvPr id="403" name="DAA/Greedy Algorithms"/>
+          <p:cNvPr id="410" name="DAA/Greedy Algorithms"/>
           <p:cNvSpPr txBox="1"/>
           <p:nvPr/>
         </p:nvSpPr>
@@ -11894,7 +12554,7 @@
       </p:sp>
       <p:sp>
         <p:nvSpPr>
-          <p:cNvPr id="404" name="RPR/"/>
+          <p:cNvPr id="411" name="RPR/"/>
           <p:cNvSpPr txBox="1"/>
           <p:nvPr/>
         </p:nvSpPr>
@@ -17270,9 +17930,9 @@
     </p:tnLst>
     <p:bldLst>
       <p:bldP build="p" bldLvl="5" animBg="1" rev="0" advAuto="0" spid="137" grpId="5"/>
-      <p:bldP build="whole" bldLvl="1" animBg="1" rev="0" advAuto="0" spid="117" grpId="3"/>
       <p:bldP build="whole" bldLvl="1" animBg="1" rev="0" advAuto="0" spid="98" grpId="2"/>
       <p:bldP build="p" bldLvl="5" animBg="1" rev="0" advAuto="0" spid="72" grpId="1"/>
+      <p:bldP build="whole" bldLvl="1" animBg="1" rev="0" advAuto="0" spid="117" grpId="3"/>
       <p:bldP build="whole" bldLvl="1" animBg="1" rev="0" advAuto="0" spid="136" grpId="4"/>
     </p:bldLst>
   </p:timing>
@@ -23329,9 +23989,9 @@
     </p:tnLst>
     <p:bldLst>
       <p:bldP build="whole" bldLvl="1" animBg="1" rev="0" advAuto="0" spid="194" grpId="1"/>
+      <p:bldP build="whole" bldLvl="1" animBg="1" rev="0" advAuto="0" spid="217" grpId="2"/>
       <p:bldP build="whole" bldLvl="1" animBg="1" rev="0" advAuto="0" spid="240" grpId="3"/>
       <p:bldP build="whole" bldLvl="1" animBg="1" rev="0" advAuto="0" spid="263" grpId="4"/>
-      <p:bldP build="whole" bldLvl="1" animBg="1" rev="0" advAuto="0" spid="217" grpId="2"/>
     </p:bldLst>
   </p:timing>
 </p:sld>

</xml_diff>